<commit_message>
replaced ${revision} parameter with static version number. prepare for release 0.0.3
</commit_message>
<xml_diff>
--- a/docs/ci/Graphics.pptx
+++ b/docs/ci/Graphics.pptx
@@ -6,21 +6,22 @@
   </p:sldMasterIdLst>
   <p:sldIdLst>
     <p:sldId id="256" r:id="rId2"/>
-    <p:sldId id="257" r:id="rId3"/>
-    <p:sldId id="270" r:id="rId4"/>
-    <p:sldId id="271" r:id="rId5"/>
-    <p:sldId id="272" r:id="rId6"/>
-    <p:sldId id="258" r:id="rId7"/>
-    <p:sldId id="268" r:id="rId8"/>
-    <p:sldId id="263" r:id="rId9"/>
-    <p:sldId id="273" r:id="rId10"/>
-    <p:sldId id="259" r:id="rId11"/>
-    <p:sldId id="262" r:id="rId12"/>
-    <p:sldId id="261" r:id="rId13"/>
-    <p:sldId id="264" r:id="rId14"/>
-    <p:sldId id="266" r:id="rId15"/>
-    <p:sldId id="267" r:id="rId16"/>
-    <p:sldId id="265" r:id="rId17"/>
+    <p:sldId id="274" r:id="rId3"/>
+    <p:sldId id="257" r:id="rId4"/>
+    <p:sldId id="270" r:id="rId5"/>
+    <p:sldId id="271" r:id="rId6"/>
+    <p:sldId id="272" r:id="rId7"/>
+    <p:sldId id="258" r:id="rId8"/>
+    <p:sldId id="268" r:id="rId9"/>
+    <p:sldId id="263" r:id="rId10"/>
+    <p:sldId id="273" r:id="rId11"/>
+    <p:sldId id="259" r:id="rId12"/>
+    <p:sldId id="262" r:id="rId13"/>
+    <p:sldId id="261" r:id="rId14"/>
+    <p:sldId id="264" r:id="rId15"/>
+    <p:sldId id="266" r:id="rId16"/>
+    <p:sldId id="267" r:id="rId17"/>
+    <p:sldId id="265" r:id="rId18"/>
   </p:sldIdLst>
   <p:sldSz cx="12192000" cy="6858000"/>
   <p:notesSz cx="9929813" cy="14357350"/>
@@ -256,7 +257,7 @@
           <a:p>
             <a:fld id="{3DB84EFA-9064-418C-9327-0DDD2A5609DA}" type="datetimeFigureOut">
               <a:rPr lang="de-DE" smtClean="0"/>
-              <a:t>11.09.2019</a:t>
+              <a:t>24.12.19</a:t>
             </a:fld>
             <a:endParaRPr lang="de-DE" dirty="0"/>
           </a:p>
@@ -424,7 +425,7 @@
           <a:p>
             <a:fld id="{3DB84EFA-9064-418C-9327-0DDD2A5609DA}" type="datetimeFigureOut">
               <a:rPr lang="de-DE" smtClean="0"/>
-              <a:t>11.09.2019</a:t>
+              <a:t>24.12.19</a:t>
             </a:fld>
             <a:endParaRPr lang="de-DE" dirty="0"/>
           </a:p>
@@ -602,7 +603,7 @@
           <a:p>
             <a:fld id="{3DB84EFA-9064-418C-9327-0DDD2A5609DA}" type="datetimeFigureOut">
               <a:rPr lang="de-DE" smtClean="0"/>
-              <a:t>11.09.2019</a:t>
+              <a:t>24.12.19</a:t>
             </a:fld>
             <a:endParaRPr lang="de-DE" dirty="0"/>
           </a:p>
@@ -770,7 +771,7 @@
           <a:p>
             <a:fld id="{3DB84EFA-9064-418C-9327-0DDD2A5609DA}" type="datetimeFigureOut">
               <a:rPr lang="de-DE" smtClean="0"/>
-              <a:t>11.09.2019</a:t>
+              <a:t>24.12.19</a:t>
             </a:fld>
             <a:endParaRPr lang="de-DE" dirty="0"/>
           </a:p>
@@ -1015,7 +1016,7 @@
           <a:p>
             <a:fld id="{3DB84EFA-9064-418C-9327-0DDD2A5609DA}" type="datetimeFigureOut">
               <a:rPr lang="de-DE" smtClean="0"/>
-              <a:t>11.09.2019</a:t>
+              <a:t>24.12.19</a:t>
             </a:fld>
             <a:endParaRPr lang="de-DE" dirty="0"/>
           </a:p>
@@ -1244,7 +1245,7 @@
           <a:p>
             <a:fld id="{3DB84EFA-9064-418C-9327-0DDD2A5609DA}" type="datetimeFigureOut">
               <a:rPr lang="de-DE" smtClean="0"/>
-              <a:t>11.09.2019</a:t>
+              <a:t>24.12.19</a:t>
             </a:fld>
             <a:endParaRPr lang="de-DE" dirty="0"/>
           </a:p>
@@ -1608,7 +1609,7 @@
           <a:p>
             <a:fld id="{3DB84EFA-9064-418C-9327-0DDD2A5609DA}" type="datetimeFigureOut">
               <a:rPr lang="de-DE" smtClean="0"/>
-              <a:t>11.09.2019</a:t>
+              <a:t>24.12.19</a:t>
             </a:fld>
             <a:endParaRPr lang="de-DE" dirty="0"/>
           </a:p>
@@ -1725,7 +1726,7 @@
           <a:p>
             <a:fld id="{3DB84EFA-9064-418C-9327-0DDD2A5609DA}" type="datetimeFigureOut">
               <a:rPr lang="de-DE" smtClean="0"/>
-              <a:t>11.09.2019</a:t>
+              <a:t>24.12.19</a:t>
             </a:fld>
             <a:endParaRPr lang="de-DE" dirty="0"/>
           </a:p>
@@ -1820,7 +1821,7 @@
           <a:p>
             <a:fld id="{3DB84EFA-9064-418C-9327-0DDD2A5609DA}" type="datetimeFigureOut">
               <a:rPr lang="de-DE" smtClean="0"/>
-              <a:t>11.09.2019</a:t>
+              <a:t>24.12.19</a:t>
             </a:fld>
             <a:endParaRPr lang="de-DE" dirty="0"/>
           </a:p>
@@ -2095,7 +2096,7 @@
           <a:p>
             <a:fld id="{3DB84EFA-9064-418C-9327-0DDD2A5609DA}" type="datetimeFigureOut">
               <a:rPr lang="de-DE" smtClean="0"/>
-              <a:t>11.09.2019</a:t>
+              <a:t>24.12.19</a:t>
             </a:fld>
             <a:endParaRPr lang="de-DE" dirty="0"/>
           </a:p>
@@ -2347,7 +2348,7 @@
           <a:p>
             <a:fld id="{3DB84EFA-9064-418C-9327-0DDD2A5609DA}" type="datetimeFigureOut">
               <a:rPr lang="de-DE" smtClean="0"/>
-              <a:t>11.09.2019</a:t>
+              <a:t>24.12.19</a:t>
             </a:fld>
             <a:endParaRPr lang="de-DE" dirty="0"/>
           </a:p>
@@ -2558,7 +2559,7 @@
           <a:p>
             <a:fld id="{3DB84EFA-9064-418C-9327-0DDD2A5609DA}" type="datetimeFigureOut">
               <a:rPr lang="de-DE" smtClean="0"/>
-              <a:t>11.09.2019</a:t>
+              <a:t>24.12.19</a:t>
             </a:fld>
             <a:endParaRPr lang="de-DE" dirty="0"/>
           </a:p>
@@ -4444,6 +4445,1131 @@
       </p:grpSpPr>
       <p:sp>
         <p:nvSpPr>
+          <p:cNvPr id="11" name="Rechteck 10"/>
+          <p:cNvSpPr/>
+          <p:nvPr/>
+        </p:nvSpPr>
+        <p:spPr>
+          <a:xfrm>
+            <a:off x="628650" y="304800"/>
+            <a:ext cx="10306050" cy="6486525"/>
+          </a:xfrm>
+          <a:prstGeom prst="rect">
+            <a:avLst/>
+          </a:prstGeom>
+          <a:solidFill>
+            <a:srgbClr val="666666"/>
+          </a:solidFill>
+          <a:ln>
+            <a:noFill/>
+          </a:ln>
+          <a:effectLst/>
+        </p:spPr>
+        <p:style>
+          <a:lnRef idx="2">
+            <a:schemeClr val="accent1">
+              <a:shade val="50000"/>
+            </a:schemeClr>
+          </a:lnRef>
+          <a:fillRef idx="1">
+            <a:schemeClr val="accent1"/>
+          </a:fillRef>
+          <a:effectRef idx="0">
+            <a:schemeClr val="accent1"/>
+          </a:effectRef>
+          <a:fontRef idx="minor">
+            <a:schemeClr val="lt1"/>
+          </a:fontRef>
+        </p:style>
+        <p:txBody>
+          <a:bodyPr rtlCol="0" anchor="ctr"/>
+          <a:lstStyle/>
+          <a:p>
+            <a:pPr algn="ctr"/>
+            <a:endParaRPr lang="de-DE" dirty="0"/>
+          </a:p>
+        </p:txBody>
+      </p:sp>
+      <p:grpSp>
+        <p:nvGrpSpPr>
+          <p:cNvPr id="12" name="Gruppieren 11">
+            <a:extLst>
+              <a:ext uri="{FF2B5EF4-FFF2-40B4-BE49-F238E27FC236}">
+                <a16:creationId xmlns:a16="http://schemas.microsoft.com/office/drawing/2014/main" id="{D1233E70-42A1-4757-91F8-504F45034333}"/>
+              </a:ext>
+            </a:extLst>
+          </p:cNvPr>
+          <p:cNvGrpSpPr/>
+          <p:nvPr/>
+        </p:nvGrpSpPr>
+        <p:grpSpPr>
+          <a:xfrm>
+            <a:off x="2533102" y="724151"/>
+            <a:ext cx="6495042" cy="1733550"/>
+            <a:chOff x="2640741" y="1263574"/>
+            <a:chExt cx="6495042" cy="1733550"/>
+          </a:xfrm>
+        </p:grpSpPr>
+        <p:sp>
+          <p:nvSpPr>
+            <p:cNvPr id="13" name="Rechteck 13">
+              <a:extLst>
+                <a:ext uri="{FF2B5EF4-FFF2-40B4-BE49-F238E27FC236}">
+                  <a16:creationId xmlns:a16="http://schemas.microsoft.com/office/drawing/2014/main" id="{65019B1A-D47B-45E3-8895-9534CD2F3535}"/>
+                </a:ext>
+              </a:extLst>
+            </p:cNvPr>
+            <p:cNvSpPr/>
+            <p:nvPr/>
+          </p:nvSpPr>
+          <p:spPr>
+            <a:xfrm flipV="1">
+              <a:off x="2640741" y="1263574"/>
+              <a:ext cx="6495042" cy="1733550"/>
+            </a:xfrm>
+            <a:prstGeom prst="foldedCorner">
+              <a:avLst>
+                <a:gd name="adj" fmla="val 24909"/>
+              </a:avLst>
+            </a:prstGeom>
+            <a:solidFill>
+              <a:srgbClr val="FFF7E1"/>
+            </a:solidFill>
+            <a:ln>
+              <a:noFill/>
+              <a:prstDash val="dash"/>
+            </a:ln>
+            <a:effectLst>
+              <a:outerShdw blurRad="139700" dist="215900" dir="2700000" algn="tl" rotWithShape="0">
+                <a:prstClr val="black">
+                  <a:alpha val="5000"/>
+                </a:prstClr>
+              </a:outerShdw>
+            </a:effectLst>
+          </p:spPr>
+          <p:style>
+            <a:lnRef idx="2">
+              <a:schemeClr val="accent1">
+                <a:shade val="50000"/>
+              </a:schemeClr>
+            </a:lnRef>
+            <a:fillRef idx="1">
+              <a:schemeClr val="accent1"/>
+            </a:fillRef>
+            <a:effectRef idx="0">
+              <a:schemeClr val="accent1"/>
+            </a:effectRef>
+            <a:fontRef idx="minor">
+              <a:schemeClr val="lt1"/>
+            </a:fontRef>
+          </p:style>
+          <p:txBody>
+            <a:bodyPr rtlCol="0" anchor="b" anchorCtr="0"/>
+            <a:lstStyle/>
+            <a:p>
+              <a:pPr algn="ctr"/>
+              <a:endParaRPr lang="de-DE" sz="1400" dirty="0">
+                <a:solidFill>
+                  <a:schemeClr val="tx1">
+                    <a:lumMod val="65000"/>
+                    <a:lumOff val="35000"/>
+                  </a:schemeClr>
+                </a:solidFill>
+                <a:latin typeface="+mj-lt"/>
+              </a:endParaRPr>
+            </a:p>
+          </p:txBody>
+        </p:sp>
+        <p:sp>
+          <p:nvSpPr>
+            <p:cNvPr id="16" name="Rechteck 3">
+              <a:extLst>
+                <a:ext uri="{FF2B5EF4-FFF2-40B4-BE49-F238E27FC236}">
+                  <a16:creationId xmlns:a16="http://schemas.microsoft.com/office/drawing/2014/main" id="{A892EE52-BA48-43CF-9CF6-F92F66AB3960}"/>
+                </a:ext>
+              </a:extLst>
+            </p:cNvPr>
+            <p:cNvSpPr/>
+            <p:nvPr/>
+          </p:nvSpPr>
+          <p:spPr>
+            <a:xfrm>
+              <a:off x="3031358" y="1807184"/>
+              <a:ext cx="5713808" cy="550962"/>
+            </a:xfrm>
+            <a:prstGeom prst="foldedCorner">
+              <a:avLst/>
+            </a:prstGeom>
+            <a:ln>
+              <a:noFill/>
+            </a:ln>
+          </p:spPr>
+          <p:txBody>
+            <a:bodyPr wrap="square">
+              <a:spAutoFit/>
+            </a:bodyPr>
+            <a:lstStyle/>
+            <a:p>
+              <a:r>
+                <a:rPr lang="de-DE" sz="1200" b="1" dirty="0">
+                  <a:latin typeface="Courier New" panose="02070309020205020404" pitchFamily="49" charset="0"/>
+                  <a:ea typeface="Calibri" panose="020F0502020204030204" pitchFamily="34" charset="0"/>
+                  <a:cs typeface="Courier New" panose="02070309020205020404" pitchFamily="49" charset="0"/>
+                </a:rPr>
+                <a:t>  IF</a:t>
+              </a:r>
+              <a:r>
+                <a:rPr lang="de-DE" sz="1200" dirty="0">
+                  <a:latin typeface="Courier New" panose="02070309020205020404" pitchFamily="49" charset="0"/>
+                  <a:ea typeface="Calibri" panose="020F0502020204030204" pitchFamily="34" charset="0"/>
+                  <a:cs typeface="Courier New" panose="02070309020205020404" pitchFamily="49" charset="0"/>
+                </a:rPr>
+                <a:t>   </a:t>
+              </a:r>
+              <a:r>
+                <a:rPr lang="de-DE" sz="1200" dirty="0" err="1">
+                  <a:latin typeface="Courier New" panose="02070309020205020404" pitchFamily="49" charset="0"/>
+                  <a:ea typeface="Calibri" panose="020F0502020204030204" pitchFamily="34" charset="0"/>
+                  <a:cs typeface="Courier New" panose="02070309020205020404" pitchFamily="49" charset="0"/>
+                </a:rPr>
+                <a:t>the</a:t>
+              </a:r>
+              <a:r>
+                <a:rPr lang="de-DE" sz="1200" dirty="0">
+                  <a:latin typeface="Courier New" panose="02070309020205020404" pitchFamily="49" charset="0"/>
+                  <a:ea typeface="Calibri" panose="020F0502020204030204" pitchFamily="34" charset="0"/>
+                  <a:cs typeface="Courier New" panose="02070309020205020404" pitchFamily="49" charset="0"/>
+                </a:rPr>
+                <a:t> </a:t>
+              </a:r>
+              <a:r>
+                <a:rPr lang="de-DE" sz="1200" b="1" dirty="0" err="1">
+                  <a:solidFill>
+                    <a:srgbClr val="00B0F0"/>
+                  </a:solidFill>
+                  <a:latin typeface="Courier New" panose="02070309020205020404" pitchFamily="49" charset="0"/>
+                  <a:ea typeface="Calibri" panose="020F0502020204030204" pitchFamily="34" charset="0"/>
+                  <a:cs typeface="Courier New" panose="02070309020205020404" pitchFamily="49" charset="0"/>
+                </a:rPr>
+                <a:t>persons</a:t>
+              </a:r>
+              <a:r>
+                <a:rPr lang="de-DE" sz="1200" dirty="0">
+                  <a:latin typeface="Courier New" panose="02070309020205020404" pitchFamily="49" charset="0"/>
+                  <a:ea typeface="Calibri" panose="020F0502020204030204" pitchFamily="34" charset="0"/>
+                  <a:cs typeface="Courier New" panose="02070309020205020404" pitchFamily="49" charset="0"/>
+                </a:rPr>
+                <a:t> </a:t>
+              </a:r>
+              <a:r>
+                <a:rPr lang="de-DE" sz="1200" b="1" dirty="0" err="1">
+                  <a:solidFill>
+                    <a:srgbClr val="00B0F0"/>
+                  </a:solidFill>
+                  <a:latin typeface="Courier New" panose="02070309020205020404" pitchFamily="49" charset="0"/>
+                  <a:ea typeface="Calibri" panose="020F0502020204030204" pitchFamily="34" charset="0"/>
+                  <a:cs typeface="Courier New" panose="02070309020205020404" pitchFamily="49" charset="0"/>
+                </a:rPr>
+                <a:t>age</a:t>
+              </a:r>
+              <a:r>
+                <a:rPr lang="de-DE" sz="1200" dirty="0">
+                  <a:latin typeface="Courier New" panose="02070309020205020404" pitchFamily="49" charset="0"/>
+                  <a:ea typeface="Calibri" panose="020F0502020204030204" pitchFamily="34" charset="0"/>
+                  <a:cs typeface="Courier New" panose="02070309020205020404" pitchFamily="49" charset="0"/>
+                </a:rPr>
+                <a:t> </a:t>
+              </a:r>
+              <a:r>
+                <a:rPr lang="de-DE" sz="1200" dirty="0" err="1">
+                  <a:latin typeface="Courier New" panose="02070309020205020404" pitchFamily="49" charset="0"/>
+                  <a:ea typeface="Calibri" panose="020F0502020204030204" pitchFamily="34" charset="0"/>
+                  <a:cs typeface="Courier New" panose="02070309020205020404" pitchFamily="49" charset="0"/>
+                </a:rPr>
+                <a:t>is</a:t>
+              </a:r>
+              <a:r>
+                <a:rPr lang="de-DE" sz="1200" dirty="0">
+                  <a:latin typeface="Courier New" panose="02070309020205020404" pitchFamily="49" charset="0"/>
+                  <a:ea typeface="Calibri" panose="020F0502020204030204" pitchFamily="34" charset="0"/>
+                  <a:cs typeface="Courier New" panose="02070309020205020404" pitchFamily="49" charset="0"/>
+                </a:rPr>
+                <a:t> </a:t>
+              </a:r>
+              <a:r>
+                <a:rPr lang="de-DE" sz="1200" b="1" dirty="0">
+                  <a:latin typeface="Courier New" panose="02070309020205020404" pitchFamily="49" charset="0"/>
+                  <a:ea typeface="Calibri" panose="020F0502020204030204" pitchFamily="34" charset="0"/>
+                  <a:cs typeface="Courier New" panose="02070309020205020404" pitchFamily="49" charset="0"/>
+                </a:rPr>
+                <a:t>LESS</a:t>
+              </a:r>
+              <a:r>
+                <a:rPr lang="de-DE" sz="1200" dirty="0">
+                  <a:latin typeface="Courier New" panose="02070309020205020404" pitchFamily="49" charset="0"/>
+                  <a:ea typeface="Calibri" panose="020F0502020204030204" pitchFamily="34" charset="0"/>
+                  <a:cs typeface="Courier New" panose="02070309020205020404" pitchFamily="49" charset="0"/>
+                </a:rPr>
+                <a:t> </a:t>
+              </a:r>
+              <a:r>
+                <a:rPr lang="de-DE" sz="1200" dirty="0" err="1">
+                  <a:latin typeface="Courier New" panose="02070309020205020404" pitchFamily="49" charset="0"/>
+                  <a:ea typeface="Calibri" panose="020F0502020204030204" pitchFamily="34" charset="0"/>
+                  <a:cs typeface="Courier New" panose="02070309020205020404" pitchFamily="49" charset="0"/>
+                </a:rPr>
+                <a:t>than</a:t>
+              </a:r>
+              <a:r>
+                <a:rPr lang="de-DE" sz="1200" dirty="0">
+                  <a:latin typeface="Courier New" panose="02070309020205020404" pitchFamily="49" charset="0"/>
+                  <a:ea typeface="Calibri" panose="020F0502020204030204" pitchFamily="34" charset="0"/>
+                  <a:cs typeface="Courier New" panose="02070309020205020404" pitchFamily="49" charset="0"/>
+                </a:rPr>
+                <a:t> </a:t>
+              </a:r>
+              <a:r>
+                <a:rPr lang="de-DE" sz="1200" b="1" dirty="0">
+                  <a:solidFill>
+                    <a:srgbClr val="00B0F0"/>
+                  </a:solidFill>
+                  <a:latin typeface="Courier New" panose="02070309020205020404" pitchFamily="49" charset="0"/>
+                  <a:ea typeface="Calibri" panose="020F0502020204030204" pitchFamily="34" charset="0"/>
+                  <a:cs typeface="Courier New" panose="02070309020205020404" pitchFamily="49" charset="0"/>
+                </a:rPr>
+                <a:t>18</a:t>
+              </a:r>
+              <a:r>
+                <a:rPr lang="de-DE" sz="1200" dirty="0">
+                  <a:latin typeface="Courier New" panose="02070309020205020404" pitchFamily="49" charset="0"/>
+                  <a:ea typeface="Calibri" panose="020F0502020204030204" pitchFamily="34" charset="0"/>
+                  <a:cs typeface="Courier New" panose="02070309020205020404" pitchFamily="49" charset="0"/>
+                </a:rPr>
+                <a:t> </a:t>
+              </a:r>
+              <a:r>
+                <a:rPr lang="de-DE" sz="1200" dirty="0" err="1">
+                  <a:latin typeface="Courier New" panose="02070309020205020404" pitchFamily="49" charset="0"/>
+                  <a:ea typeface="Calibri" panose="020F0502020204030204" pitchFamily="34" charset="0"/>
+                  <a:cs typeface="Courier New" panose="02070309020205020404" pitchFamily="49" charset="0"/>
+                </a:rPr>
+                <a:t>years</a:t>
+              </a:r>
+              <a:br>
+                <a:rPr lang="de-DE" sz="1200" dirty="0">
+                  <a:latin typeface="Consolas" panose="020B0609020204030204" pitchFamily="49" charset="0"/>
+                  <a:ea typeface="Calibri" panose="020F0502020204030204" pitchFamily="34" charset="0"/>
+                  <a:cs typeface="Times New Roman" panose="02020603050405020304" pitchFamily="18" charset="0"/>
+                </a:rPr>
+              </a:br>
+              <a:r>
+                <a:rPr lang="de-DE" sz="1200" b="1" dirty="0">
+                  <a:latin typeface="Courier New" panose="02070309020205020404" pitchFamily="49" charset="0"/>
+                  <a:ea typeface="Calibri" panose="020F0502020204030204" pitchFamily="34" charset="0"/>
+                  <a:cs typeface="Courier New" panose="02070309020205020404" pitchFamily="49" charset="0"/>
+                </a:rPr>
+                <a:t>THEN   </a:t>
+              </a:r>
+              <a:r>
+                <a:rPr lang="de-DE" sz="1200" dirty="0" err="1">
+                  <a:latin typeface="Courier New" panose="02070309020205020404" pitchFamily="49" charset="0"/>
+                  <a:ea typeface="Calibri" panose="020F0502020204030204" pitchFamily="34" charset="0"/>
+                  <a:cs typeface="Courier New" panose="02070309020205020404" pitchFamily="49" charset="0"/>
+                </a:rPr>
+                <a:t>You</a:t>
+              </a:r>
+              <a:r>
+                <a:rPr lang="de-DE" sz="1200" dirty="0">
+                  <a:latin typeface="Courier New" panose="02070309020205020404" pitchFamily="49" charset="0"/>
+                  <a:ea typeface="Calibri" panose="020F0502020204030204" pitchFamily="34" charset="0"/>
+                  <a:cs typeface="Courier New" panose="02070309020205020404" pitchFamily="49" charset="0"/>
+                </a:rPr>
+                <a:t> </a:t>
+              </a:r>
+              <a:r>
+                <a:rPr lang="de-DE" sz="1200" dirty="0" err="1">
+                  <a:latin typeface="Courier New" panose="02070309020205020404" pitchFamily="49" charset="0"/>
+                  <a:ea typeface="Calibri" panose="020F0502020204030204" pitchFamily="34" charset="0"/>
+                  <a:cs typeface="Courier New" panose="02070309020205020404" pitchFamily="49" charset="0"/>
+                </a:rPr>
+                <a:t>are</a:t>
+              </a:r>
+              <a:r>
+                <a:rPr lang="de-DE" sz="1200" dirty="0">
+                  <a:latin typeface="Courier New" panose="02070309020205020404" pitchFamily="49" charset="0"/>
+                  <a:ea typeface="Calibri" panose="020F0502020204030204" pitchFamily="34" charset="0"/>
+                  <a:cs typeface="Courier New" panose="02070309020205020404" pitchFamily="49" charset="0"/>
+                </a:rPr>
+                <a:t> </a:t>
+              </a:r>
+              <a:r>
+                <a:rPr lang="de-DE" sz="1200" dirty="0" err="1">
+                  <a:latin typeface="Courier New" panose="02070309020205020404" pitchFamily="49" charset="0"/>
+                  <a:ea typeface="Calibri" panose="020F0502020204030204" pitchFamily="34" charset="0"/>
+                  <a:cs typeface="Courier New" panose="02070309020205020404" pitchFamily="49" charset="0"/>
+                </a:rPr>
+                <a:t>underage</a:t>
+              </a:r>
+              <a:r>
+                <a:rPr lang="de-DE" sz="1200" dirty="0">
+                  <a:latin typeface="Courier New" panose="02070309020205020404" pitchFamily="49" charset="0"/>
+                  <a:ea typeface="Calibri" panose="020F0502020204030204" pitchFamily="34" charset="0"/>
+                  <a:cs typeface="Courier New" panose="02070309020205020404" pitchFamily="49" charset="0"/>
+                </a:rPr>
+                <a:t> and </a:t>
+              </a:r>
+              <a:r>
+                <a:rPr lang="de-DE" sz="1200" dirty="0" err="1">
+                  <a:latin typeface="Courier New" panose="02070309020205020404" pitchFamily="49" charset="0"/>
+                  <a:ea typeface="Calibri" panose="020F0502020204030204" pitchFamily="34" charset="0"/>
+                  <a:cs typeface="Courier New" panose="02070309020205020404" pitchFamily="49" charset="0"/>
+                </a:rPr>
+                <a:t>can‘t</a:t>
+              </a:r>
+              <a:r>
+                <a:rPr lang="de-DE" sz="1200" dirty="0">
+                  <a:latin typeface="Courier New" panose="02070309020205020404" pitchFamily="49" charset="0"/>
+                  <a:ea typeface="Calibri" panose="020F0502020204030204" pitchFamily="34" charset="0"/>
+                  <a:cs typeface="Courier New" panose="02070309020205020404" pitchFamily="49" charset="0"/>
+                </a:rPr>
+                <a:t> </a:t>
+              </a:r>
+              <a:r>
+                <a:rPr lang="de-DE" sz="1200" dirty="0" err="1">
+                  <a:latin typeface="Courier New" panose="02070309020205020404" pitchFamily="49" charset="0"/>
+                  <a:ea typeface="Calibri" panose="020F0502020204030204" pitchFamily="34" charset="0"/>
+                  <a:cs typeface="Courier New" panose="02070309020205020404" pitchFamily="49" charset="0"/>
+                </a:rPr>
+                <a:t>sign</a:t>
+              </a:r>
+              <a:r>
+                <a:rPr lang="de-DE" sz="1200" dirty="0">
+                  <a:latin typeface="Courier New" panose="02070309020205020404" pitchFamily="49" charset="0"/>
+                  <a:ea typeface="Calibri" panose="020F0502020204030204" pitchFamily="34" charset="0"/>
+                  <a:cs typeface="Courier New" panose="02070309020205020404" pitchFamily="49" charset="0"/>
+                </a:rPr>
+                <a:t> </a:t>
+              </a:r>
+              <a:r>
+                <a:rPr lang="de-DE" sz="1200" dirty="0" err="1">
+                  <a:latin typeface="Courier New" panose="02070309020205020404" pitchFamily="49" charset="0"/>
+                  <a:ea typeface="Calibri" panose="020F0502020204030204" pitchFamily="34" charset="0"/>
+                  <a:cs typeface="Courier New" panose="02070309020205020404" pitchFamily="49" charset="0"/>
+                </a:rPr>
+                <a:t>this</a:t>
+              </a:r>
+              <a:r>
+                <a:rPr lang="de-DE" sz="1200" dirty="0">
+                  <a:latin typeface="Courier New" panose="02070309020205020404" pitchFamily="49" charset="0"/>
+                  <a:ea typeface="Calibri" panose="020F0502020204030204" pitchFamily="34" charset="0"/>
+                  <a:cs typeface="Courier New" panose="02070309020205020404" pitchFamily="49" charset="0"/>
+                </a:rPr>
+                <a:t> </a:t>
+              </a:r>
+              <a:r>
+                <a:rPr lang="de-DE" sz="1200" dirty="0" err="1">
+                  <a:latin typeface="Courier New" panose="02070309020205020404" pitchFamily="49" charset="0"/>
+                  <a:ea typeface="Calibri" panose="020F0502020204030204" pitchFamily="34" charset="0"/>
+                  <a:cs typeface="Courier New" panose="02070309020205020404" pitchFamily="49" charset="0"/>
+                </a:rPr>
+                <a:t>contract</a:t>
+              </a:r>
+              <a:r>
+                <a:rPr lang="de-DE" sz="1200" dirty="0">
+                  <a:latin typeface="Courier New" panose="02070309020205020404" pitchFamily="49" charset="0"/>
+                  <a:ea typeface="Calibri" panose="020F0502020204030204" pitchFamily="34" charset="0"/>
+                  <a:cs typeface="Courier New" panose="02070309020205020404" pitchFamily="49" charset="0"/>
+                </a:rPr>
+                <a:t>!</a:t>
+              </a:r>
+              <a:endParaRPr lang="de-DE" sz="1200" i="1" dirty="0">
+                <a:solidFill>
+                  <a:srgbClr val="C00000"/>
+                </a:solidFill>
+                <a:latin typeface="Courier New" panose="02070309020205020404" pitchFamily="49" charset="0"/>
+                <a:cs typeface="Courier New" panose="02070309020205020404" pitchFamily="49" charset="0"/>
+              </a:endParaRPr>
+            </a:p>
+          </p:txBody>
+        </p:sp>
+      </p:grpSp>
+      <p:cxnSp>
+        <p:nvCxnSpPr>
+          <p:cNvPr id="17" name="Gerade Verbindung mit Pfeil 4">
+            <a:extLst>
+              <a:ext uri="{FF2B5EF4-FFF2-40B4-BE49-F238E27FC236}">
+                <a16:creationId xmlns:a16="http://schemas.microsoft.com/office/drawing/2014/main" id="{20D537E6-B37F-495A-B8D5-C66433AB44BC}"/>
+              </a:ext>
+            </a:extLst>
+          </p:cNvPr>
+          <p:cNvCxnSpPr/>
+          <p:nvPr/>
+        </p:nvCxnSpPr>
+        <p:spPr>
+          <a:xfrm flipV="1">
+            <a:off x="5771623" y="2603911"/>
+            <a:ext cx="9000" cy="405427"/>
+          </a:xfrm>
+          <a:prstGeom prst="straightConnector1">
+            <a:avLst/>
+          </a:prstGeom>
+          <a:ln w="3175">
+            <a:solidFill>
+              <a:schemeClr val="bg1">
+                <a:lumMod val="95000"/>
+                <a:alpha val="66000"/>
+              </a:schemeClr>
+            </a:solidFill>
+            <a:prstDash val="dash"/>
+            <a:headEnd type="none" w="med" len="med"/>
+            <a:tailEnd type="none" w="sm" len="sm"/>
+          </a:ln>
+          <a:effectLst/>
+        </p:spPr>
+        <p:style>
+          <a:lnRef idx="2">
+            <a:schemeClr val="accent1"/>
+          </a:lnRef>
+          <a:fillRef idx="0">
+            <a:schemeClr val="accent1"/>
+          </a:fillRef>
+          <a:effectRef idx="1">
+            <a:schemeClr val="accent1"/>
+          </a:effectRef>
+          <a:fontRef idx="minor">
+            <a:schemeClr val="tx1"/>
+          </a:fontRef>
+        </p:style>
+      </p:cxnSp>
+      <p:pic>
+        <p:nvPicPr>
+          <p:cNvPr id="18" name="Grafik 17">
+            <a:extLst>
+              <a:ext uri="{FF2B5EF4-FFF2-40B4-BE49-F238E27FC236}">
+                <a16:creationId xmlns:a16="http://schemas.microsoft.com/office/drawing/2014/main" id="{A26680A1-2356-4E6C-9D72-D8595E64B544}"/>
+              </a:ext>
+            </a:extLst>
+          </p:cNvPr>
+          <p:cNvPicPr>
+            <a:picLocks noChangeAspect="1"/>
+          </p:cNvPicPr>
+          <p:nvPr/>
+        </p:nvPicPr>
+        <p:blipFill>
+          <a:blip r:embed="rId2">
+            <a:duotone>
+              <a:schemeClr val="accent3">
+                <a:shade val="45000"/>
+                <a:satMod val="135000"/>
+              </a:schemeClr>
+              <a:prstClr val="white"/>
+            </a:duotone>
+            <a:extLst>
+              <a:ext uri="{28A0092B-C50C-407E-A947-70E740481C1C}">
+                <a14:useLocalDpi xmlns:a14="http://schemas.microsoft.com/office/drawing/2010/main" val="0"/>
+              </a:ext>
+            </a:extLst>
+          </a:blip>
+          <a:stretch>
+            <a:fillRect/>
+          </a:stretch>
+        </p:blipFill>
+        <p:spPr>
+          <a:xfrm>
+            <a:off x="4980786" y="3116150"/>
+            <a:ext cx="1599675" cy="454997"/>
+          </a:xfrm>
+          <a:prstGeom prst="rect">
+            <a:avLst/>
+          </a:prstGeom>
+          <a:effectLst/>
+        </p:spPr>
+      </p:pic>
+      <p:cxnSp>
+        <p:nvCxnSpPr>
+          <p:cNvPr id="19" name="Gerade Verbindung mit Pfeil 4">
+            <a:extLst>
+              <a:ext uri="{FF2B5EF4-FFF2-40B4-BE49-F238E27FC236}">
+                <a16:creationId xmlns:a16="http://schemas.microsoft.com/office/drawing/2014/main" id="{C5697B01-CE6B-41B3-8F91-A3E57E43B3FD}"/>
+              </a:ext>
+            </a:extLst>
+          </p:cNvPr>
+          <p:cNvCxnSpPr/>
+          <p:nvPr/>
+        </p:nvCxnSpPr>
+        <p:spPr>
+          <a:xfrm flipV="1">
+            <a:off x="5762623" y="3756601"/>
+            <a:ext cx="9000" cy="405427"/>
+          </a:xfrm>
+          <a:prstGeom prst="straightConnector1">
+            <a:avLst/>
+          </a:prstGeom>
+          <a:ln w="3175">
+            <a:solidFill>
+              <a:schemeClr val="bg1">
+                <a:lumMod val="95000"/>
+                <a:alpha val="66000"/>
+              </a:schemeClr>
+            </a:solidFill>
+            <a:prstDash val="dash"/>
+            <a:headEnd type="stealth" w="med" len="med"/>
+            <a:tailEnd type="none" w="sm" len="sm"/>
+          </a:ln>
+          <a:effectLst/>
+        </p:spPr>
+        <p:style>
+          <a:lnRef idx="2">
+            <a:schemeClr val="accent1"/>
+          </a:lnRef>
+          <a:fillRef idx="0">
+            <a:schemeClr val="accent1"/>
+          </a:fillRef>
+          <a:effectRef idx="1">
+            <a:schemeClr val="accent1"/>
+          </a:effectRef>
+          <a:fontRef idx="minor">
+            <a:schemeClr val="tx1"/>
+          </a:fontRef>
+        </p:style>
+      </p:cxnSp>
+      <p:grpSp>
+        <p:nvGrpSpPr>
+          <p:cNvPr id="21" name="Gruppieren 20">
+            <a:extLst>
+              <a:ext uri="{FF2B5EF4-FFF2-40B4-BE49-F238E27FC236}">
+                <a16:creationId xmlns:a16="http://schemas.microsoft.com/office/drawing/2014/main" id="{30D461F6-FDBF-4174-95BD-BFCFFA28D77E}"/>
+              </a:ext>
+            </a:extLst>
+          </p:cNvPr>
+          <p:cNvGrpSpPr/>
+          <p:nvPr/>
+        </p:nvGrpSpPr>
+        <p:grpSpPr>
+          <a:xfrm>
+            <a:off x="2533102" y="4318907"/>
+            <a:ext cx="6495042" cy="1733550"/>
+            <a:chOff x="2640741" y="4549699"/>
+            <a:chExt cx="6495042" cy="1733550"/>
+          </a:xfrm>
+        </p:grpSpPr>
+        <p:sp>
+          <p:nvSpPr>
+            <p:cNvPr id="22" name="Abgerundetes Rechteck 19">
+              <a:extLst>
+                <a:ext uri="{FF2B5EF4-FFF2-40B4-BE49-F238E27FC236}">
+                  <a16:creationId xmlns:a16="http://schemas.microsoft.com/office/drawing/2014/main" id="{7E311FE5-D939-4B6D-A1BA-046D4B522F40}"/>
+                </a:ext>
+              </a:extLst>
+            </p:cNvPr>
+            <p:cNvSpPr/>
+            <p:nvPr/>
+          </p:nvSpPr>
+          <p:spPr>
+            <a:xfrm>
+              <a:off x="2640741" y="4549699"/>
+              <a:ext cx="6495042" cy="1733550"/>
+            </a:xfrm>
+            <a:prstGeom prst="roundRect">
+              <a:avLst>
+                <a:gd name="adj" fmla="val 6227"/>
+              </a:avLst>
+            </a:prstGeom>
+            <a:solidFill>
+              <a:srgbClr val="ECF3FA"/>
+            </a:solidFill>
+            <a:ln>
+              <a:noFill/>
+            </a:ln>
+            <a:effectLst>
+              <a:outerShdw blurRad="139700" dist="215900" dir="2700000" algn="tl" rotWithShape="0">
+                <a:prstClr val="black">
+                  <a:alpha val="5000"/>
+                </a:prstClr>
+              </a:outerShdw>
+            </a:effectLst>
+          </p:spPr>
+          <p:style>
+            <a:lnRef idx="2">
+              <a:schemeClr val="accent1">
+                <a:shade val="50000"/>
+              </a:schemeClr>
+            </a:lnRef>
+            <a:fillRef idx="1">
+              <a:schemeClr val="accent1"/>
+            </a:fillRef>
+            <a:effectRef idx="0">
+              <a:schemeClr val="accent1"/>
+            </a:effectRef>
+            <a:fontRef idx="minor">
+              <a:schemeClr val="lt1"/>
+            </a:fontRef>
+          </p:style>
+          <p:txBody>
+            <a:bodyPr rtlCol="0" anchor="b" anchorCtr="0"/>
+            <a:lstStyle/>
+            <a:p>
+              <a:pPr algn="ctr"/>
+              <a:endParaRPr lang="de-DE" sz="1400" dirty="0">
+                <a:solidFill>
+                  <a:schemeClr val="tx1">
+                    <a:lumMod val="65000"/>
+                    <a:lumOff val="35000"/>
+                  </a:schemeClr>
+                </a:solidFill>
+                <a:latin typeface="+mj-lt"/>
+              </a:endParaRPr>
+            </a:p>
+          </p:txBody>
+        </p:sp>
+        <p:sp>
+          <p:nvSpPr>
+            <p:cNvPr id="24" name="Rechteck 23">
+              <a:extLst>
+                <a:ext uri="{FF2B5EF4-FFF2-40B4-BE49-F238E27FC236}">
+                  <a16:creationId xmlns:a16="http://schemas.microsoft.com/office/drawing/2014/main" id="{9664CB5E-F4F0-4FF2-8A41-3C2CC69D3188}"/>
+                </a:ext>
+              </a:extLst>
+            </p:cNvPr>
+            <p:cNvSpPr/>
+            <p:nvPr/>
+          </p:nvSpPr>
+          <p:spPr>
+            <a:xfrm>
+              <a:off x="3031358" y="4959959"/>
+              <a:ext cx="5713808" cy="1015663"/>
+            </a:xfrm>
+            <a:prstGeom prst="rect">
+              <a:avLst/>
+            </a:prstGeom>
+            <a:ln>
+              <a:noFill/>
+            </a:ln>
+          </p:spPr>
+          <p:txBody>
+            <a:bodyPr wrap="square">
+              <a:spAutoFit/>
+            </a:bodyPr>
+            <a:lstStyle/>
+            <a:p>
+              <a:r>
+                <a:rPr lang="de-DE" sz="1200" b="1" dirty="0">
+                  <a:solidFill>
+                    <a:srgbClr val="004362"/>
+                  </a:solidFill>
+                  <a:latin typeface="Courier New" panose="02070309020205020404" pitchFamily="49" charset="0"/>
+                  <a:ea typeface="Calibri" panose="020F0502020204030204" pitchFamily="34" charset="0"/>
+                  <a:cs typeface="Courier New" panose="02070309020205020404" pitchFamily="49" charset="0"/>
+                </a:rPr>
+                <a:t>if</a:t>
+              </a:r>
+              <a:r>
+                <a:rPr lang="de-DE" sz="1200" b="1" dirty="0">
+                  <a:latin typeface="Courier New" panose="02070309020205020404" pitchFamily="49" charset="0"/>
+                  <a:ea typeface="Calibri" panose="020F0502020204030204" pitchFamily="34" charset="0"/>
+                  <a:cs typeface="Courier New" panose="02070309020205020404" pitchFamily="49" charset="0"/>
+                </a:rPr>
+                <a:t> ( </a:t>
+              </a:r>
+              <a:r>
+                <a:rPr lang="de-DE" sz="1200" b="1" dirty="0" err="1">
+                  <a:solidFill>
+                    <a:srgbClr val="00C1E4"/>
+                  </a:solidFill>
+                  <a:latin typeface="Courier New" panose="02070309020205020404" pitchFamily="49" charset="0"/>
+                  <a:ea typeface="Calibri" panose="020F0502020204030204" pitchFamily="34" charset="0"/>
+                  <a:cs typeface="Courier New" panose="02070309020205020404" pitchFamily="49" charset="0"/>
+                </a:rPr>
+                <a:t>Person</a:t>
+              </a:r>
+              <a:r>
+                <a:rPr lang="de-DE" sz="1200" b="1" dirty="0" err="1">
+                  <a:latin typeface="Courier New" panose="02070309020205020404" pitchFamily="49" charset="0"/>
+                  <a:ea typeface="Calibri" panose="020F0502020204030204" pitchFamily="34" charset="0"/>
+                  <a:cs typeface="Courier New" panose="02070309020205020404" pitchFamily="49" charset="0"/>
+                </a:rPr>
+                <a:t>.</a:t>
+              </a:r>
+              <a:r>
+                <a:rPr lang="de-DE" sz="1200" b="1" dirty="0" err="1">
+                  <a:solidFill>
+                    <a:srgbClr val="00C1E4"/>
+                  </a:solidFill>
+                  <a:latin typeface="Courier New" panose="02070309020205020404" pitchFamily="49" charset="0"/>
+                  <a:ea typeface="Calibri" panose="020F0502020204030204" pitchFamily="34" charset="0"/>
+                  <a:cs typeface="Courier New" panose="02070309020205020404" pitchFamily="49" charset="0"/>
+                </a:rPr>
+                <a:t>age</a:t>
+              </a:r>
+              <a:r>
+                <a:rPr lang="de-DE" sz="1200" b="1" dirty="0">
+                  <a:latin typeface="Courier New" panose="02070309020205020404" pitchFamily="49" charset="0"/>
+                  <a:ea typeface="Calibri" panose="020F0502020204030204" pitchFamily="34" charset="0"/>
+                  <a:cs typeface="Courier New" panose="02070309020205020404" pitchFamily="49" charset="0"/>
+                </a:rPr>
+                <a:t> &lt; </a:t>
+              </a:r>
+              <a:r>
+                <a:rPr lang="de-DE" sz="1200" b="1" dirty="0">
+                  <a:solidFill>
+                    <a:srgbClr val="00C1E4"/>
+                  </a:solidFill>
+                  <a:latin typeface="Courier New" panose="02070309020205020404" pitchFamily="49" charset="0"/>
+                  <a:ea typeface="Calibri" panose="020F0502020204030204" pitchFamily="34" charset="0"/>
+                  <a:cs typeface="Courier New" panose="02070309020205020404" pitchFamily="49" charset="0"/>
+                </a:rPr>
+                <a:t>18</a:t>
+              </a:r>
+              <a:r>
+                <a:rPr lang="de-DE" sz="1200" b="1" dirty="0">
+                  <a:latin typeface="Courier New" panose="02070309020205020404" pitchFamily="49" charset="0"/>
+                  <a:ea typeface="Calibri" panose="020F0502020204030204" pitchFamily="34" charset="0"/>
+                  <a:cs typeface="Courier New" panose="02070309020205020404" pitchFamily="49" charset="0"/>
+                </a:rPr>
+                <a:t> ){</a:t>
+              </a:r>
+            </a:p>
+            <a:p>
+              <a:r>
+                <a:rPr lang="de-DE" sz="1200" b="1" dirty="0">
+                  <a:latin typeface="Courier New" panose="02070309020205020404" pitchFamily="49" charset="0"/>
+                  <a:ea typeface="Calibri" panose="020F0502020204030204" pitchFamily="34" charset="0"/>
+                  <a:cs typeface="Courier New" panose="02070309020205020404" pitchFamily="49" charset="0"/>
+                </a:rPr>
+                <a:t>    </a:t>
+              </a:r>
+              <a:r>
+                <a:rPr lang="de-DE" sz="1200" b="1" dirty="0">
+                  <a:solidFill>
+                    <a:srgbClr val="004362"/>
+                  </a:solidFill>
+                  <a:latin typeface="Courier New" panose="02070309020205020404" pitchFamily="49" charset="0"/>
+                  <a:ea typeface="Calibri" panose="020F0502020204030204" pitchFamily="34" charset="0"/>
+                  <a:cs typeface="Courier New" panose="02070309020205020404" pitchFamily="49" charset="0"/>
+                </a:rPr>
+                <a:t>throw</a:t>
+              </a:r>
+              <a:r>
+                <a:rPr lang="de-DE" sz="1200" b="1" dirty="0">
+                  <a:latin typeface="Courier New" panose="02070309020205020404" pitchFamily="49" charset="0"/>
+                  <a:ea typeface="Calibri" panose="020F0502020204030204" pitchFamily="34" charset="0"/>
+                  <a:cs typeface="Courier New" panose="02070309020205020404" pitchFamily="49" charset="0"/>
+                </a:rPr>
+                <a:t> </a:t>
+              </a:r>
+              <a:r>
+                <a:rPr lang="de-DE" sz="1200" b="1" dirty="0">
+                  <a:solidFill>
+                    <a:srgbClr val="004362"/>
+                  </a:solidFill>
+                  <a:latin typeface="Courier New" panose="02070309020205020404" pitchFamily="49" charset="0"/>
+                  <a:ea typeface="Calibri" panose="020F0502020204030204" pitchFamily="34" charset="0"/>
+                  <a:cs typeface="Courier New" panose="02070309020205020404" pitchFamily="49" charset="0"/>
+                </a:rPr>
+                <a:t>new</a:t>
+              </a:r>
+              <a:r>
+                <a:rPr lang="de-DE" sz="1200" b="1" dirty="0">
+                  <a:latin typeface="Courier New" panose="02070309020205020404" pitchFamily="49" charset="0"/>
+                  <a:ea typeface="Calibri" panose="020F0502020204030204" pitchFamily="34" charset="0"/>
+                  <a:cs typeface="Courier New" panose="02070309020205020404" pitchFamily="49" charset="0"/>
+                </a:rPr>
+                <a:t> </a:t>
+              </a:r>
+              <a:r>
+                <a:rPr lang="de-DE" sz="1200" b="1" dirty="0" err="1">
+                  <a:latin typeface="Courier New" panose="02070309020205020404" pitchFamily="49" charset="0"/>
+                  <a:ea typeface="Calibri" panose="020F0502020204030204" pitchFamily="34" charset="0"/>
+                  <a:cs typeface="Courier New" panose="02070309020205020404" pitchFamily="49" charset="0"/>
+                </a:rPr>
+                <a:t>Exception</a:t>
+              </a:r>
+              <a:r>
+                <a:rPr lang="de-DE" sz="1200" b="1" dirty="0">
+                  <a:latin typeface="Courier New" panose="02070309020205020404" pitchFamily="49" charset="0"/>
+                  <a:ea typeface="Calibri" panose="020F0502020204030204" pitchFamily="34" charset="0"/>
+                  <a:cs typeface="Courier New" panose="02070309020205020404" pitchFamily="49" charset="0"/>
+                </a:rPr>
+                <a:t>(</a:t>
+              </a:r>
+              <a:r>
+                <a:rPr lang="de-DE" sz="1200" b="1" dirty="0">
+                  <a:solidFill>
+                    <a:srgbClr val="C00000"/>
+                  </a:solidFill>
+                  <a:latin typeface="Courier New" panose="02070309020205020404" pitchFamily="49" charset="0"/>
+                  <a:ea typeface="Calibri" panose="020F0502020204030204" pitchFamily="34" charset="0"/>
+                  <a:cs typeface="Courier New" panose="02070309020205020404" pitchFamily="49" charset="0"/>
+                </a:rPr>
+                <a:t>„</a:t>
+              </a:r>
+              <a:r>
+                <a:rPr lang="de-DE" sz="1200" dirty="0">
+                  <a:solidFill>
+                    <a:srgbClr val="C00000"/>
+                  </a:solidFill>
+                  <a:latin typeface="Courier New" panose="02070309020205020404" pitchFamily="49" charset="0"/>
+                  <a:ea typeface="Calibri" panose="020F0502020204030204" pitchFamily="34" charset="0"/>
+                  <a:cs typeface="Courier New" panose="02070309020205020404" pitchFamily="49" charset="0"/>
+                </a:rPr>
+                <a:t> </a:t>
+              </a:r>
+              <a:r>
+                <a:rPr lang="de-DE" sz="1200" dirty="0" err="1">
+                  <a:solidFill>
+                    <a:srgbClr val="C00000"/>
+                  </a:solidFill>
+                  <a:latin typeface="Courier New" panose="02070309020205020404" pitchFamily="49" charset="0"/>
+                  <a:ea typeface="Calibri" panose="020F0502020204030204" pitchFamily="34" charset="0"/>
+                  <a:cs typeface="Courier New" panose="02070309020205020404" pitchFamily="49" charset="0"/>
+                </a:rPr>
+                <a:t>You</a:t>
+              </a:r>
+              <a:r>
+                <a:rPr lang="de-DE" sz="1200" dirty="0">
+                  <a:solidFill>
+                    <a:srgbClr val="C00000"/>
+                  </a:solidFill>
+                  <a:latin typeface="Courier New" panose="02070309020205020404" pitchFamily="49" charset="0"/>
+                  <a:ea typeface="Calibri" panose="020F0502020204030204" pitchFamily="34" charset="0"/>
+                  <a:cs typeface="Courier New" panose="02070309020205020404" pitchFamily="49" charset="0"/>
+                </a:rPr>
+                <a:t> </a:t>
+              </a:r>
+              <a:r>
+                <a:rPr lang="de-DE" sz="1200" dirty="0" err="1">
+                  <a:solidFill>
+                    <a:srgbClr val="C00000"/>
+                  </a:solidFill>
+                  <a:latin typeface="Courier New" panose="02070309020205020404" pitchFamily="49" charset="0"/>
+                  <a:ea typeface="Calibri" panose="020F0502020204030204" pitchFamily="34" charset="0"/>
+                  <a:cs typeface="Courier New" panose="02070309020205020404" pitchFamily="49" charset="0"/>
+                </a:rPr>
+                <a:t>are</a:t>
+              </a:r>
+              <a:r>
+                <a:rPr lang="de-DE" sz="1200" dirty="0">
+                  <a:solidFill>
+                    <a:srgbClr val="C00000"/>
+                  </a:solidFill>
+                  <a:latin typeface="Courier New" panose="02070309020205020404" pitchFamily="49" charset="0"/>
+                  <a:ea typeface="Calibri" panose="020F0502020204030204" pitchFamily="34" charset="0"/>
+                  <a:cs typeface="Courier New" panose="02070309020205020404" pitchFamily="49" charset="0"/>
+                </a:rPr>
+                <a:t> </a:t>
+              </a:r>
+              <a:r>
+                <a:rPr lang="de-DE" sz="1200" dirty="0" err="1">
+                  <a:solidFill>
+                    <a:srgbClr val="C00000"/>
+                  </a:solidFill>
+                  <a:latin typeface="Courier New" panose="02070309020205020404" pitchFamily="49" charset="0"/>
+                  <a:ea typeface="Calibri" panose="020F0502020204030204" pitchFamily="34" charset="0"/>
+                  <a:cs typeface="Courier New" panose="02070309020205020404" pitchFamily="49" charset="0"/>
+                </a:rPr>
+                <a:t>underage</a:t>
+              </a:r>
+              <a:r>
+                <a:rPr lang="de-DE" sz="1200" dirty="0">
+                  <a:solidFill>
+                    <a:srgbClr val="C00000"/>
+                  </a:solidFill>
+                  <a:latin typeface="Courier New" panose="02070309020205020404" pitchFamily="49" charset="0"/>
+                  <a:ea typeface="Calibri" panose="020F0502020204030204" pitchFamily="34" charset="0"/>
+                  <a:cs typeface="Courier New" panose="02070309020205020404" pitchFamily="49" charset="0"/>
+                </a:rPr>
+                <a:t> and </a:t>
+              </a:r>
+              <a:r>
+                <a:rPr lang="de-DE" sz="1200" dirty="0" err="1">
+                  <a:solidFill>
+                    <a:srgbClr val="C00000"/>
+                  </a:solidFill>
+                  <a:latin typeface="Courier New" panose="02070309020205020404" pitchFamily="49" charset="0"/>
+                  <a:ea typeface="Calibri" panose="020F0502020204030204" pitchFamily="34" charset="0"/>
+                  <a:cs typeface="Courier New" panose="02070309020205020404" pitchFamily="49" charset="0"/>
+                </a:rPr>
+                <a:t>can‘t</a:t>
+              </a:r>
+              <a:r>
+                <a:rPr lang="de-DE" sz="1200" dirty="0">
+                  <a:solidFill>
+                    <a:srgbClr val="C00000"/>
+                  </a:solidFill>
+                  <a:latin typeface="Courier New" panose="02070309020205020404" pitchFamily="49" charset="0"/>
+                  <a:ea typeface="Calibri" panose="020F0502020204030204" pitchFamily="34" charset="0"/>
+                  <a:cs typeface="Courier New" panose="02070309020205020404" pitchFamily="49" charset="0"/>
+                </a:rPr>
+                <a:t> </a:t>
+              </a:r>
+              <a:r>
+                <a:rPr lang="de-DE" sz="1200" dirty="0" err="1">
+                  <a:solidFill>
+                    <a:srgbClr val="C00000"/>
+                  </a:solidFill>
+                  <a:latin typeface="Courier New" panose="02070309020205020404" pitchFamily="49" charset="0"/>
+                  <a:ea typeface="Calibri" panose="020F0502020204030204" pitchFamily="34" charset="0"/>
+                  <a:cs typeface="Courier New" panose="02070309020205020404" pitchFamily="49" charset="0"/>
+                </a:rPr>
+                <a:t>sign</a:t>
+              </a:r>
+              <a:r>
+                <a:rPr lang="de-DE" sz="1200" dirty="0">
+                  <a:solidFill>
+                    <a:srgbClr val="C00000"/>
+                  </a:solidFill>
+                  <a:latin typeface="Courier New" panose="02070309020205020404" pitchFamily="49" charset="0"/>
+                  <a:ea typeface="Calibri" panose="020F0502020204030204" pitchFamily="34" charset="0"/>
+                  <a:cs typeface="Courier New" panose="02070309020205020404" pitchFamily="49" charset="0"/>
+                </a:rPr>
+                <a:t> 			      </a:t>
+              </a:r>
+              <a:r>
+                <a:rPr lang="de-DE" sz="1200" dirty="0" err="1">
+                  <a:solidFill>
+                    <a:srgbClr val="C00000"/>
+                  </a:solidFill>
+                  <a:latin typeface="Courier New" panose="02070309020205020404" pitchFamily="49" charset="0"/>
+                  <a:ea typeface="Calibri" panose="020F0502020204030204" pitchFamily="34" charset="0"/>
+                  <a:cs typeface="Courier New" panose="02070309020205020404" pitchFamily="49" charset="0"/>
+                </a:rPr>
+                <a:t>this</a:t>
+              </a:r>
+              <a:r>
+                <a:rPr lang="de-DE" sz="1200" dirty="0">
+                  <a:solidFill>
+                    <a:srgbClr val="C00000"/>
+                  </a:solidFill>
+                  <a:latin typeface="Courier New" panose="02070309020205020404" pitchFamily="49" charset="0"/>
+                  <a:ea typeface="Calibri" panose="020F0502020204030204" pitchFamily="34" charset="0"/>
+                  <a:cs typeface="Courier New" panose="02070309020205020404" pitchFamily="49" charset="0"/>
+                </a:rPr>
+                <a:t> </a:t>
+              </a:r>
+              <a:r>
+                <a:rPr lang="de-DE" sz="1200" dirty="0" err="1">
+                  <a:solidFill>
+                    <a:srgbClr val="C00000"/>
+                  </a:solidFill>
+                  <a:latin typeface="Courier New" panose="02070309020205020404" pitchFamily="49" charset="0"/>
+                  <a:ea typeface="Calibri" panose="020F0502020204030204" pitchFamily="34" charset="0"/>
+                  <a:cs typeface="Courier New" panose="02070309020205020404" pitchFamily="49" charset="0"/>
+                </a:rPr>
+                <a:t>contract</a:t>
+              </a:r>
+              <a:r>
+                <a:rPr lang="de-DE" sz="1200" i="1" dirty="0">
+                  <a:solidFill>
+                    <a:srgbClr val="C00000"/>
+                  </a:solidFill>
+                  <a:latin typeface="Courier New" panose="02070309020205020404" pitchFamily="49" charset="0"/>
+                  <a:ea typeface="Calibri" panose="020F0502020204030204" pitchFamily="34" charset="0"/>
+                  <a:cs typeface="Courier New" panose="02070309020205020404" pitchFamily="49" charset="0"/>
+                </a:rPr>
+                <a:t>!</a:t>
+              </a:r>
+              <a:r>
+                <a:rPr lang="de-DE" sz="1200" b="1" dirty="0">
+                  <a:solidFill>
+                    <a:srgbClr val="C00000"/>
+                  </a:solidFill>
+                  <a:latin typeface="Courier New" panose="02070309020205020404" pitchFamily="49" charset="0"/>
+                  <a:ea typeface="Calibri" panose="020F0502020204030204" pitchFamily="34" charset="0"/>
+                  <a:cs typeface="Courier New" panose="02070309020205020404" pitchFamily="49" charset="0"/>
+                </a:rPr>
+                <a:t>“</a:t>
+              </a:r>
+              <a:r>
+                <a:rPr lang="de-DE" sz="1200" b="1" dirty="0">
+                  <a:latin typeface="Courier New" panose="02070309020205020404" pitchFamily="49" charset="0"/>
+                  <a:ea typeface="Calibri" panose="020F0502020204030204" pitchFamily="34" charset="0"/>
+                  <a:cs typeface="Courier New" panose="02070309020205020404" pitchFamily="49" charset="0"/>
+                </a:rPr>
+                <a:t>);</a:t>
+              </a:r>
+            </a:p>
+            <a:p>
+              <a:r>
+                <a:rPr lang="de-DE" sz="1200" b="1" dirty="0">
+                  <a:latin typeface="Courier New" panose="02070309020205020404" pitchFamily="49" charset="0"/>
+                  <a:ea typeface="Calibri" panose="020F0502020204030204" pitchFamily="34" charset="0"/>
+                  <a:cs typeface="Courier New" panose="02070309020205020404" pitchFamily="49" charset="0"/>
+                </a:rPr>
+                <a:t>}</a:t>
+              </a:r>
+              <a:endParaRPr lang="de-DE" sz="1200" i="1" dirty="0">
+                <a:solidFill>
+                  <a:schemeClr val="tx1">
+                    <a:lumMod val="50000"/>
+                    <a:lumOff val="50000"/>
+                  </a:schemeClr>
+                </a:solidFill>
+                <a:latin typeface="Courier New" panose="02070309020205020404" pitchFamily="49" charset="0"/>
+                <a:ea typeface="Calibri" panose="020F0502020204030204" pitchFamily="34" charset="0"/>
+                <a:cs typeface="Courier New" panose="02070309020205020404" pitchFamily="49" charset="0"/>
+              </a:endParaRPr>
+            </a:p>
+            <a:p>
+              <a:r>
+                <a:rPr lang="de-DE" sz="1200" i="1" dirty="0">
+                  <a:solidFill>
+                    <a:schemeClr val="tx1">
+                      <a:lumMod val="50000"/>
+                      <a:lumOff val="50000"/>
+                    </a:schemeClr>
+                  </a:solidFill>
+                  <a:latin typeface="Courier New" panose="02070309020205020404" pitchFamily="49" charset="0"/>
+                  <a:ea typeface="Calibri" panose="020F0502020204030204" pitchFamily="34" charset="0"/>
+                  <a:cs typeface="Courier New" panose="02070309020205020404" pitchFamily="49" charset="0"/>
+                </a:rPr>
+                <a:t>       </a:t>
+              </a:r>
+              <a:endParaRPr lang="de-DE" sz="1200" i="1" dirty="0">
+                <a:solidFill>
+                  <a:schemeClr val="tx1">
+                    <a:lumMod val="50000"/>
+                    <a:lumOff val="50000"/>
+                  </a:schemeClr>
+                </a:solidFill>
+                <a:latin typeface="Courier New" panose="02070309020205020404" pitchFamily="49" charset="0"/>
+                <a:cs typeface="Courier New" panose="02070309020205020404" pitchFamily="49" charset="0"/>
+              </a:endParaRPr>
+            </a:p>
+          </p:txBody>
+        </p:sp>
+      </p:grpSp>
+    </p:spTree>
+    <p:extLst>
+      <p:ext uri="{BB962C8B-B14F-4D97-AF65-F5344CB8AC3E}">
+        <p14:creationId xmlns:p14="http://schemas.microsoft.com/office/powerpoint/2010/main" val="4286552020"/>
+      </p:ext>
+    </p:extLst>
+  </p:cSld>
+  <p:clrMapOvr>
+    <a:masterClrMapping/>
+  </p:clrMapOvr>
+</p:sld>
+</file>
+
+<file path=ppt/slides/slide11.xml><?xml version="1.0" encoding="utf-8"?>
+<p:sld xmlns:a="http://schemas.openxmlformats.org/drawingml/2006/main" xmlns:r="http://schemas.openxmlformats.org/officeDocument/2006/relationships" xmlns:p="http://schemas.openxmlformats.org/presentationml/2006/main">
+  <p:cSld>
+    <p:spTree>
+      <p:nvGrpSpPr>
+        <p:cNvPr id="1" name=""/>
+        <p:cNvGrpSpPr/>
+        <p:nvPr/>
+      </p:nvGrpSpPr>
+      <p:grpSpPr>
+        <a:xfrm>
+          <a:off x="0" y="0"/>
+          <a:ext cx="0" cy="0"/>
+          <a:chOff x="0" y="0"/>
+          <a:chExt cx="0" cy="0"/>
+        </a:xfrm>
+      </p:grpSpPr>
+      <p:sp>
+        <p:nvSpPr>
           <p:cNvPr id="24" name="Rechteck 23"/>
           <p:cNvSpPr/>
           <p:nvPr/>
@@ -5108,7 +6234,7 @@
 </p:sld>
 </file>
 
-<file path=ppt/slides/slide11.xml><?xml version="1.0" encoding="utf-8"?>
+<file path=ppt/slides/slide12.xml><?xml version="1.0" encoding="utf-8"?>
 <p:sld xmlns:a="http://schemas.openxmlformats.org/drawingml/2006/main" xmlns:r="http://schemas.openxmlformats.org/officeDocument/2006/relationships" xmlns:p="http://schemas.openxmlformats.org/presentationml/2006/main">
   <p:cSld>
     <p:spTree>
@@ -6063,7 +7189,7 @@
 </p:sld>
 </file>
 
-<file path=ppt/slides/slide12.xml><?xml version="1.0" encoding="utf-8"?>
+<file path=ppt/slides/slide13.xml><?xml version="1.0" encoding="utf-8"?>
 <p:sld xmlns:a="http://schemas.openxmlformats.org/drawingml/2006/main" xmlns:r="http://schemas.openxmlformats.org/officeDocument/2006/relationships" xmlns:p="http://schemas.openxmlformats.org/presentationml/2006/main">
   <p:cSld>
     <p:spTree>
@@ -6766,7 +7892,7 @@
 </p:sld>
 </file>
 
-<file path=ppt/slides/slide13.xml><?xml version="1.0" encoding="utf-8"?>
+<file path=ppt/slides/slide14.xml><?xml version="1.0" encoding="utf-8"?>
 <p:sld xmlns:a="http://schemas.openxmlformats.org/drawingml/2006/main" xmlns:r="http://schemas.openxmlformats.org/officeDocument/2006/relationships" xmlns:p="http://schemas.openxmlformats.org/presentationml/2006/main">
   <p:cSld>
     <p:spTree>
@@ -7410,7 +8536,7 @@
 </p:sld>
 </file>
 
-<file path=ppt/slides/slide14.xml><?xml version="1.0" encoding="utf-8"?>
+<file path=ppt/slides/slide15.xml><?xml version="1.0" encoding="utf-8"?>
 <p:sld xmlns:a="http://schemas.openxmlformats.org/drawingml/2006/main" xmlns:r="http://schemas.openxmlformats.org/officeDocument/2006/relationships" xmlns:p="http://schemas.openxmlformats.org/presentationml/2006/main">
   <p:cSld>
     <p:spTree>
@@ -8025,7 +9151,7 @@
 </p:sld>
 </file>
 
-<file path=ppt/slides/slide15.xml><?xml version="1.0" encoding="utf-8"?>
+<file path=ppt/slides/slide16.xml><?xml version="1.0" encoding="utf-8"?>
 <p:sld xmlns:a="http://schemas.openxmlformats.org/drawingml/2006/main" xmlns:r="http://schemas.openxmlformats.org/officeDocument/2006/relationships" xmlns:p="http://schemas.openxmlformats.org/presentationml/2006/main">
   <p:cSld>
     <p:spTree>
@@ -8209,7 +9335,7 @@
 </p:sld>
 </file>
 
-<file path=ppt/slides/slide16.xml><?xml version="1.0" encoding="utf-8"?>
+<file path=ppt/slides/slide17.xml><?xml version="1.0" encoding="utf-8"?>
 <p:sld xmlns:a="http://schemas.openxmlformats.org/drawingml/2006/main" xmlns:r="http://schemas.openxmlformats.org/officeDocument/2006/relationships" xmlns:p="http://schemas.openxmlformats.org/presentationml/2006/main">
   <p:cSld>
     <p:spTree>
@@ -8539,6 +9665,162 @@
           <a:chExt cx="0" cy="0"/>
         </a:xfrm>
       </p:grpSpPr>
+      <p:pic>
+        <p:nvPicPr>
+          <p:cNvPr id="7" name="Grafik 6">
+            <a:extLst>
+              <a:ext uri="{FF2B5EF4-FFF2-40B4-BE49-F238E27FC236}">
+                <a16:creationId xmlns:a16="http://schemas.microsoft.com/office/drawing/2014/main" id="{0B23ABC4-CB70-1D4F-846D-7ABEB3B868D5}"/>
+              </a:ext>
+            </a:extLst>
+          </p:cNvPr>
+          <p:cNvPicPr>
+            <a:picLocks noChangeAspect="1"/>
+          </p:cNvPicPr>
+          <p:nvPr/>
+        </p:nvPicPr>
+        <p:blipFill>
+          <a:blip r:embed="rId2">
+            <a:extLst>
+              <a:ext uri="{28A0092B-C50C-407E-A947-70E740481C1C}">
+                <a14:useLocalDpi xmlns:a14="http://schemas.microsoft.com/office/drawing/2010/main" val="0"/>
+              </a:ext>
+            </a:extLst>
+          </a:blip>
+          <a:stretch>
+            <a:fillRect/>
+          </a:stretch>
+        </p:blipFill>
+        <p:spPr>
+          <a:xfrm>
+            <a:off x="-4579830" y="-3158836"/>
+            <a:ext cx="25187428" cy="25187428"/>
+          </a:xfrm>
+          <a:prstGeom prst="rect">
+            <a:avLst/>
+          </a:prstGeom>
+        </p:spPr>
+      </p:pic>
+      <p:sp>
+        <p:nvSpPr>
+          <p:cNvPr id="13" name="Textfeld 12">
+            <a:extLst>
+              <a:ext uri="{FF2B5EF4-FFF2-40B4-BE49-F238E27FC236}">
+                <a16:creationId xmlns:a16="http://schemas.microsoft.com/office/drawing/2014/main" id="{CFA7D59C-B323-D145-97B7-792FBB396A98}"/>
+              </a:ext>
+            </a:extLst>
+          </p:cNvPr>
+          <p:cNvSpPr txBox="1"/>
+          <p:nvPr/>
+        </p:nvSpPr>
+        <p:spPr>
+          <a:xfrm>
+            <a:off x="1869031" y="2578533"/>
+            <a:ext cx="10495472" cy="2800767"/>
+          </a:xfrm>
+          <a:prstGeom prst="rect">
+            <a:avLst/>
+          </a:prstGeom>
+          <a:noFill/>
+        </p:spPr>
+        <p:txBody>
+          <a:bodyPr wrap="square" rtlCol="0">
+            <a:spAutoFit/>
+          </a:bodyPr>
+          <a:lstStyle/>
+          <a:p>
+            <a:r>
+              <a:rPr lang="en-US" sz="4400" dirty="0">
+                <a:solidFill>
+                  <a:schemeClr val="bg1"/>
+                </a:solidFill>
+                <a:latin typeface="+mj-lt"/>
+                <a:cs typeface="Broadway" panose="020F0502020204030204" pitchFamily="34" charset="0"/>
+              </a:rPr>
+              <a:t>Instead of forcing humans to understand the complex inner workings of machines, we should construct machines in a way, so they better understand us humans!</a:t>
+            </a:r>
+          </a:p>
+        </p:txBody>
+      </p:sp>
+      <p:pic>
+        <p:nvPicPr>
+          <p:cNvPr id="21" name="Grafik 20" descr="Ein Bild, das Vogel enthält.&#10;&#10;Automatisch generierte Beschreibung">
+            <a:extLst>
+              <a:ext uri="{FF2B5EF4-FFF2-40B4-BE49-F238E27FC236}">
+                <a16:creationId xmlns:a16="http://schemas.microsoft.com/office/drawing/2014/main" id="{07F14191-70F4-E144-9EFC-E3A6BB00B094}"/>
+              </a:ext>
+            </a:extLst>
+          </p:cNvPr>
+          <p:cNvPicPr>
+            <a:picLocks noChangeAspect="1"/>
+          </p:cNvPicPr>
+          <p:nvPr/>
+        </p:nvPicPr>
+        <p:blipFill>
+          <a:blip r:embed="rId3">
+            <a:lum bright="70000" contrast="-70000"/>
+            <a:extLst>
+              <a:ext uri="{BEBA8EAE-BF5A-486C-A8C5-ECC9F3942E4B}">
+                <a14:imgProps xmlns:a14="http://schemas.microsoft.com/office/drawing/2010/main">
+                  <a14:imgLayer r:embed="rId4">
+                    <a14:imgEffect>
+                      <a14:colorTemperature colorTemp="1500"/>
+                    </a14:imgEffect>
+                    <a14:imgEffect>
+                      <a14:saturation sat="0"/>
+                    </a14:imgEffect>
+                  </a14:imgLayer>
+                </a14:imgProps>
+              </a:ext>
+              <a:ext uri="{28A0092B-C50C-407E-A947-70E740481C1C}">
+                <a14:useLocalDpi xmlns:a14="http://schemas.microsoft.com/office/drawing/2010/main" val="0"/>
+              </a:ext>
+            </a:extLst>
+          </a:blip>
+          <a:stretch>
+            <a:fillRect/>
+          </a:stretch>
+        </p:blipFill>
+        <p:spPr>
+          <a:xfrm>
+            <a:off x="1960471" y="598283"/>
+            <a:ext cx="4241800" cy="1206500"/>
+          </a:xfrm>
+          <a:prstGeom prst="rect">
+            <a:avLst/>
+          </a:prstGeom>
+        </p:spPr>
+      </p:pic>
+    </p:spTree>
+    <p:extLst>
+      <p:ext uri="{BB962C8B-B14F-4D97-AF65-F5344CB8AC3E}">
+        <p14:creationId xmlns:p14="http://schemas.microsoft.com/office/powerpoint/2010/main" val="2093431967"/>
+      </p:ext>
+    </p:extLst>
+  </p:cSld>
+  <p:clrMapOvr>
+    <a:masterClrMapping/>
+  </p:clrMapOvr>
+</p:sld>
+</file>
+
+<file path=ppt/slides/slide3.xml><?xml version="1.0" encoding="utf-8"?>
+<p:sld xmlns:a="http://schemas.openxmlformats.org/drawingml/2006/main" xmlns:r="http://schemas.openxmlformats.org/officeDocument/2006/relationships" xmlns:p="http://schemas.openxmlformats.org/presentationml/2006/main">
+  <p:cSld>
+    <p:spTree>
+      <p:nvGrpSpPr>
+        <p:cNvPr id="1" name=""/>
+        <p:cNvGrpSpPr/>
+        <p:nvPr/>
+      </p:nvGrpSpPr>
+      <p:grpSpPr>
+        <a:xfrm>
+          <a:off x="0" y="0"/>
+          <a:ext cx="0" cy="0"/>
+          <a:chOff x="0" y="0"/>
+          <a:chExt cx="0" cy="0"/>
+        </a:xfrm>
+      </p:grpSpPr>
       <p:sp>
         <p:nvSpPr>
           <p:cNvPr id="6" name="Wolkenförmige Legende 5"/>
@@ -8694,14 +9976,6 @@
                 <a:cs typeface="Courier New" panose="02070309020205020404" pitchFamily="49" charset="0"/>
               </a:rPr>
               <a:t>18</a:t>
-            </a:r>
-            <a:r>
-              <a:rPr lang="de-DE" sz="1200" dirty="0">
-                <a:latin typeface="Consolas" panose="020B0609020204030204" pitchFamily="49" charset="0"/>
-                <a:ea typeface="Calibri" panose="020F0502020204030204" pitchFamily="34" charset="0"/>
-                <a:cs typeface="Times New Roman" panose="02020603050405020304" pitchFamily="18" charset="0"/>
-              </a:rPr>
-              <a:t/>
             </a:r>
             <a:br>
               <a:rPr lang="de-DE" sz="1200" dirty="0">
@@ -9326,7 +10600,7 @@
 </p:sld>
 </file>
 
-<file path=ppt/slides/slide3.xml><?xml version="1.0" encoding="utf-8"?>
+<file path=ppt/slides/slide4.xml><?xml version="1.0" encoding="utf-8"?>
 <p:sld xmlns:a="http://schemas.openxmlformats.org/drawingml/2006/main" xmlns:r="http://schemas.openxmlformats.org/officeDocument/2006/relationships" xmlns:p="http://schemas.openxmlformats.org/presentationml/2006/main">
   <p:cSld>
     <p:spTree>
@@ -9498,14 +10772,6 @@
                 <a:cs typeface="Courier New" panose="02070309020205020404" pitchFamily="49" charset="0"/>
               </a:rPr>
               <a:t>18</a:t>
-            </a:r>
-            <a:r>
-              <a:rPr lang="de-DE" sz="1200" dirty="0">
-                <a:latin typeface="Consolas" panose="020B0609020204030204" pitchFamily="49" charset="0"/>
-                <a:ea typeface="Calibri" panose="020F0502020204030204" pitchFamily="34" charset="0"/>
-                <a:cs typeface="Times New Roman" panose="02020603050405020304" pitchFamily="18" charset="0"/>
-              </a:rPr>
-              <a:t/>
             </a:r>
             <a:br>
               <a:rPr lang="de-DE" sz="1200" dirty="0">
@@ -10130,7 +11396,7 @@
 </p:sld>
 </file>
 
-<file path=ppt/slides/slide4.xml><?xml version="1.0" encoding="utf-8"?>
+<file path=ppt/slides/slide5.xml><?xml version="1.0" encoding="utf-8"?>
 <p:sld xmlns:a="http://schemas.openxmlformats.org/drawingml/2006/main" xmlns:r="http://schemas.openxmlformats.org/officeDocument/2006/relationships" xmlns:p="http://schemas.openxmlformats.org/presentationml/2006/main">
   <p:cSld>
     <p:spTree>
@@ -10366,14 +11632,6 @@
                 <a:cs typeface="Courier New" panose="02070309020205020404" pitchFamily="49" charset="0"/>
               </a:rPr>
               <a:t>years</a:t>
-            </a:r>
-            <a:r>
-              <a:rPr lang="de-DE" sz="1200" dirty="0">
-                <a:latin typeface="Consolas" panose="020B0609020204030204" pitchFamily="49" charset="0"/>
-                <a:ea typeface="Calibri" panose="020F0502020204030204" pitchFamily="34" charset="0"/>
-                <a:cs typeface="Times New Roman" panose="02020603050405020304" pitchFamily="18" charset="0"/>
-              </a:rPr>
-              <a:t/>
             </a:r>
             <a:br>
               <a:rPr lang="de-DE" sz="1200" dirty="0">
@@ -11120,7 +12378,7 @@
 </p:sld>
 </file>
 
-<file path=ppt/slides/slide5.xml><?xml version="1.0" encoding="utf-8"?>
+<file path=ppt/slides/slide6.xml><?xml version="1.0" encoding="utf-8"?>
 <p:sld xmlns:a="http://schemas.openxmlformats.org/drawingml/2006/main" xmlns:r="http://schemas.openxmlformats.org/officeDocument/2006/relationships" xmlns:p="http://schemas.openxmlformats.org/presentationml/2006/main">
   <p:cSld>
     <p:spTree>
@@ -11356,14 +12614,6 @@
                 <a:cs typeface="Courier New" panose="02070309020205020404" pitchFamily="49" charset="0"/>
               </a:rPr>
               <a:t>years</a:t>
-            </a:r>
-            <a:r>
-              <a:rPr lang="de-DE" sz="1200" dirty="0">
-                <a:latin typeface="Consolas" panose="020B0609020204030204" pitchFamily="49" charset="0"/>
-                <a:ea typeface="Calibri" panose="020F0502020204030204" pitchFamily="34" charset="0"/>
-                <a:cs typeface="Times New Roman" panose="02020603050405020304" pitchFamily="18" charset="0"/>
-              </a:rPr>
-              <a:t/>
             </a:r>
             <a:br>
               <a:rPr lang="de-DE" sz="1200" dirty="0">
@@ -12110,7 +13360,7 @@
 </p:sld>
 </file>
 
-<file path=ppt/slides/slide6.xml><?xml version="1.0" encoding="utf-8"?>
+<file path=ppt/slides/slide7.xml><?xml version="1.0" encoding="utf-8"?>
 <p:sld xmlns:a="http://schemas.openxmlformats.org/drawingml/2006/main" xmlns:r="http://schemas.openxmlformats.org/officeDocument/2006/relationships" xmlns:p="http://schemas.openxmlformats.org/presentationml/2006/main">
   <p:cSld>
     <p:spTree>
@@ -12308,14 +13558,6 @@
                   <a:cs typeface="Courier New" panose="02070309020205020404" pitchFamily="49" charset="0"/>
                 </a:rPr>
                 <a:t>18</a:t>
-              </a:r>
-              <a:r>
-                <a:rPr lang="de-DE" sz="1200" dirty="0">
-                  <a:latin typeface="Consolas" panose="020B0609020204030204" pitchFamily="49" charset="0"/>
-                  <a:ea typeface="Calibri" panose="020F0502020204030204" pitchFamily="34" charset="0"/>
-                  <a:cs typeface="Times New Roman" panose="02020603050405020304" pitchFamily="18" charset="0"/>
-                </a:rPr>
-                <a:t/>
               </a:r>
               <a:br>
                 <a:rPr lang="de-DE" sz="1200" dirty="0">
@@ -12873,7 +14115,7 @@
 </p:sld>
 </file>
 
-<file path=ppt/slides/slide7.xml><?xml version="1.0" encoding="utf-8"?>
+<file path=ppt/slides/slide8.xml><?xml version="1.0" encoding="utf-8"?>
 <p:sld xmlns:a="http://schemas.openxmlformats.org/drawingml/2006/main" xmlns:r="http://schemas.openxmlformats.org/officeDocument/2006/relationships" xmlns:p="http://schemas.openxmlformats.org/presentationml/2006/main">
   <p:cSld>
     <p:spTree>
@@ -13135,14 +14377,6 @@
                   <a:cs typeface="Courier New" panose="02070309020205020404" pitchFamily="49" charset="0"/>
                 </a:rPr>
                 <a:t>years</a:t>
-              </a:r>
-              <a:r>
-                <a:rPr lang="de-DE" sz="1200" dirty="0">
-                  <a:latin typeface="Consolas" panose="020B0609020204030204" pitchFamily="49" charset="0"/>
-                  <a:ea typeface="Calibri" panose="020F0502020204030204" pitchFamily="34" charset="0"/>
-                  <a:cs typeface="Times New Roman" panose="02020603050405020304" pitchFamily="18" charset="0"/>
-                </a:rPr>
-                <a:t/>
               </a:r>
               <a:br>
                 <a:rPr lang="de-DE" sz="1200" dirty="0">
@@ -13908,7 +15142,7 @@
 </p:sld>
 </file>
 
-<file path=ppt/slides/slide8.xml><?xml version="1.0" encoding="utf-8"?>
+<file path=ppt/slides/slide9.xml><?xml version="1.0" encoding="utf-8"?>
 <p:sld xmlns:a="http://schemas.openxmlformats.org/drawingml/2006/main" xmlns:r="http://schemas.openxmlformats.org/officeDocument/2006/relationships" xmlns:p="http://schemas.openxmlformats.org/presentationml/2006/main">
   <p:cSld>
     <p:spTree>
@@ -14152,14 +15386,6 @@
                 </a:rPr>
                 <a:t>18</a:t>
               </a:r>
-              <a:r>
-                <a:rPr lang="de-DE" sz="1200" dirty="0">
-                  <a:latin typeface="Consolas" panose="020B0609020204030204" pitchFamily="49" charset="0"/>
-                  <a:ea typeface="Calibri" panose="020F0502020204030204" pitchFamily="34" charset="0"/>
-                  <a:cs typeface="Times New Roman" panose="02020603050405020304" pitchFamily="18" charset="0"/>
-                </a:rPr>
-                <a:t/>
-              </a:r>
               <a:br>
                 <a:rPr lang="de-DE" sz="1200" dirty="0">
                   <a:latin typeface="Consolas" panose="020B0609020204030204" pitchFamily="49" charset="0"/>
@@ -14698,1139 +15924,6 @@
     <p:extLst>
       <p:ext uri="{BB962C8B-B14F-4D97-AF65-F5344CB8AC3E}">
         <p14:creationId xmlns:p14="http://schemas.microsoft.com/office/powerpoint/2010/main" val="2547310796"/>
-      </p:ext>
-    </p:extLst>
-  </p:cSld>
-  <p:clrMapOvr>
-    <a:masterClrMapping/>
-  </p:clrMapOvr>
-</p:sld>
-</file>
-
-<file path=ppt/slides/slide9.xml><?xml version="1.0" encoding="utf-8"?>
-<p:sld xmlns:a="http://schemas.openxmlformats.org/drawingml/2006/main" xmlns:r="http://schemas.openxmlformats.org/officeDocument/2006/relationships" xmlns:p="http://schemas.openxmlformats.org/presentationml/2006/main">
-  <p:cSld>
-    <p:spTree>
-      <p:nvGrpSpPr>
-        <p:cNvPr id="1" name=""/>
-        <p:cNvGrpSpPr/>
-        <p:nvPr/>
-      </p:nvGrpSpPr>
-      <p:grpSpPr>
-        <a:xfrm>
-          <a:off x="0" y="0"/>
-          <a:ext cx="0" cy="0"/>
-          <a:chOff x="0" y="0"/>
-          <a:chExt cx="0" cy="0"/>
-        </a:xfrm>
-      </p:grpSpPr>
-      <p:sp>
-        <p:nvSpPr>
-          <p:cNvPr id="11" name="Rechteck 10"/>
-          <p:cNvSpPr/>
-          <p:nvPr/>
-        </p:nvSpPr>
-        <p:spPr>
-          <a:xfrm>
-            <a:off x="628650" y="304800"/>
-            <a:ext cx="10306050" cy="6486525"/>
-          </a:xfrm>
-          <a:prstGeom prst="rect">
-            <a:avLst/>
-          </a:prstGeom>
-          <a:solidFill>
-            <a:srgbClr val="666666"/>
-          </a:solidFill>
-          <a:ln>
-            <a:noFill/>
-          </a:ln>
-          <a:effectLst/>
-        </p:spPr>
-        <p:style>
-          <a:lnRef idx="2">
-            <a:schemeClr val="accent1">
-              <a:shade val="50000"/>
-            </a:schemeClr>
-          </a:lnRef>
-          <a:fillRef idx="1">
-            <a:schemeClr val="accent1"/>
-          </a:fillRef>
-          <a:effectRef idx="0">
-            <a:schemeClr val="accent1"/>
-          </a:effectRef>
-          <a:fontRef idx="minor">
-            <a:schemeClr val="lt1"/>
-          </a:fontRef>
-        </p:style>
-        <p:txBody>
-          <a:bodyPr rtlCol="0" anchor="ctr"/>
-          <a:lstStyle/>
-          <a:p>
-            <a:pPr algn="ctr"/>
-            <a:endParaRPr lang="de-DE" dirty="0"/>
-          </a:p>
-        </p:txBody>
-      </p:sp>
-      <p:grpSp>
-        <p:nvGrpSpPr>
-          <p:cNvPr id="12" name="Gruppieren 11">
-            <a:extLst>
-              <a:ext uri="{FF2B5EF4-FFF2-40B4-BE49-F238E27FC236}">
-                <a16:creationId xmlns:a16="http://schemas.microsoft.com/office/drawing/2014/main" id="{D1233E70-42A1-4757-91F8-504F45034333}"/>
-              </a:ext>
-            </a:extLst>
-          </p:cNvPr>
-          <p:cNvGrpSpPr/>
-          <p:nvPr/>
-        </p:nvGrpSpPr>
-        <p:grpSpPr>
-          <a:xfrm>
-            <a:off x="2533102" y="724151"/>
-            <a:ext cx="6495042" cy="1733550"/>
-            <a:chOff x="2640741" y="1263574"/>
-            <a:chExt cx="6495042" cy="1733550"/>
-          </a:xfrm>
-        </p:grpSpPr>
-        <p:sp>
-          <p:nvSpPr>
-            <p:cNvPr id="13" name="Rechteck 13">
-              <a:extLst>
-                <a:ext uri="{FF2B5EF4-FFF2-40B4-BE49-F238E27FC236}">
-                  <a16:creationId xmlns:a16="http://schemas.microsoft.com/office/drawing/2014/main" id="{65019B1A-D47B-45E3-8895-9534CD2F3535}"/>
-                </a:ext>
-              </a:extLst>
-            </p:cNvPr>
-            <p:cNvSpPr/>
-            <p:nvPr/>
-          </p:nvSpPr>
-          <p:spPr>
-            <a:xfrm flipV="1">
-              <a:off x="2640741" y="1263574"/>
-              <a:ext cx="6495042" cy="1733550"/>
-            </a:xfrm>
-            <a:prstGeom prst="foldedCorner">
-              <a:avLst>
-                <a:gd name="adj" fmla="val 24909"/>
-              </a:avLst>
-            </a:prstGeom>
-            <a:solidFill>
-              <a:srgbClr val="FFF7E1"/>
-            </a:solidFill>
-            <a:ln>
-              <a:noFill/>
-              <a:prstDash val="dash"/>
-            </a:ln>
-            <a:effectLst>
-              <a:outerShdw blurRad="139700" dist="215900" dir="2700000" algn="tl" rotWithShape="0">
-                <a:prstClr val="black">
-                  <a:alpha val="5000"/>
-                </a:prstClr>
-              </a:outerShdw>
-            </a:effectLst>
-          </p:spPr>
-          <p:style>
-            <a:lnRef idx="2">
-              <a:schemeClr val="accent1">
-                <a:shade val="50000"/>
-              </a:schemeClr>
-            </a:lnRef>
-            <a:fillRef idx="1">
-              <a:schemeClr val="accent1"/>
-            </a:fillRef>
-            <a:effectRef idx="0">
-              <a:schemeClr val="accent1"/>
-            </a:effectRef>
-            <a:fontRef idx="minor">
-              <a:schemeClr val="lt1"/>
-            </a:fontRef>
-          </p:style>
-          <p:txBody>
-            <a:bodyPr rtlCol="0" anchor="b" anchorCtr="0"/>
-            <a:lstStyle/>
-            <a:p>
-              <a:pPr algn="ctr"/>
-              <a:endParaRPr lang="de-DE" sz="1400" dirty="0">
-                <a:solidFill>
-                  <a:schemeClr val="tx1">
-                    <a:lumMod val="65000"/>
-                    <a:lumOff val="35000"/>
-                  </a:schemeClr>
-                </a:solidFill>
-                <a:latin typeface="+mj-lt"/>
-              </a:endParaRPr>
-            </a:p>
-          </p:txBody>
-        </p:sp>
-        <p:sp>
-          <p:nvSpPr>
-            <p:cNvPr id="16" name="Rechteck 3">
-              <a:extLst>
-                <a:ext uri="{FF2B5EF4-FFF2-40B4-BE49-F238E27FC236}">
-                  <a16:creationId xmlns:a16="http://schemas.microsoft.com/office/drawing/2014/main" id="{A892EE52-BA48-43CF-9CF6-F92F66AB3960}"/>
-                </a:ext>
-              </a:extLst>
-            </p:cNvPr>
-            <p:cNvSpPr/>
-            <p:nvPr/>
-          </p:nvSpPr>
-          <p:spPr>
-            <a:xfrm>
-              <a:off x="3031358" y="1807184"/>
-              <a:ext cx="5713808" cy="550962"/>
-            </a:xfrm>
-            <a:prstGeom prst="foldedCorner">
-              <a:avLst/>
-            </a:prstGeom>
-            <a:ln>
-              <a:noFill/>
-            </a:ln>
-          </p:spPr>
-          <p:txBody>
-            <a:bodyPr wrap="square">
-              <a:spAutoFit/>
-            </a:bodyPr>
-            <a:lstStyle/>
-            <a:p>
-              <a:r>
-                <a:rPr lang="de-DE" sz="1200" b="1" dirty="0">
-                  <a:latin typeface="Courier New" panose="02070309020205020404" pitchFamily="49" charset="0"/>
-                  <a:ea typeface="Calibri" panose="020F0502020204030204" pitchFamily="34" charset="0"/>
-                  <a:cs typeface="Courier New" panose="02070309020205020404" pitchFamily="49" charset="0"/>
-                </a:rPr>
-                <a:t>  IF</a:t>
-              </a:r>
-              <a:r>
-                <a:rPr lang="de-DE" sz="1200" dirty="0">
-                  <a:latin typeface="Courier New" panose="02070309020205020404" pitchFamily="49" charset="0"/>
-                  <a:ea typeface="Calibri" panose="020F0502020204030204" pitchFamily="34" charset="0"/>
-                  <a:cs typeface="Courier New" panose="02070309020205020404" pitchFamily="49" charset="0"/>
-                </a:rPr>
-                <a:t>   </a:t>
-              </a:r>
-              <a:r>
-                <a:rPr lang="de-DE" sz="1200" dirty="0" err="1">
-                  <a:latin typeface="Courier New" panose="02070309020205020404" pitchFamily="49" charset="0"/>
-                  <a:ea typeface="Calibri" panose="020F0502020204030204" pitchFamily="34" charset="0"/>
-                  <a:cs typeface="Courier New" panose="02070309020205020404" pitchFamily="49" charset="0"/>
-                </a:rPr>
-                <a:t>the</a:t>
-              </a:r>
-              <a:r>
-                <a:rPr lang="de-DE" sz="1200" dirty="0">
-                  <a:latin typeface="Courier New" panose="02070309020205020404" pitchFamily="49" charset="0"/>
-                  <a:ea typeface="Calibri" panose="020F0502020204030204" pitchFamily="34" charset="0"/>
-                  <a:cs typeface="Courier New" panose="02070309020205020404" pitchFamily="49" charset="0"/>
-                </a:rPr>
-                <a:t> </a:t>
-              </a:r>
-              <a:r>
-                <a:rPr lang="de-DE" sz="1200" b="1" dirty="0" err="1">
-                  <a:solidFill>
-                    <a:srgbClr val="00B0F0"/>
-                  </a:solidFill>
-                  <a:latin typeface="Courier New" panose="02070309020205020404" pitchFamily="49" charset="0"/>
-                  <a:ea typeface="Calibri" panose="020F0502020204030204" pitchFamily="34" charset="0"/>
-                  <a:cs typeface="Courier New" panose="02070309020205020404" pitchFamily="49" charset="0"/>
-                </a:rPr>
-                <a:t>persons</a:t>
-              </a:r>
-              <a:r>
-                <a:rPr lang="de-DE" sz="1200" dirty="0">
-                  <a:latin typeface="Courier New" panose="02070309020205020404" pitchFamily="49" charset="0"/>
-                  <a:ea typeface="Calibri" panose="020F0502020204030204" pitchFamily="34" charset="0"/>
-                  <a:cs typeface="Courier New" panose="02070309020205020404" pitchFamily="49" charset="0"/>
-                </a:rPr>
-                <a:t> </a:t>
-              </a:r>
-              <a:r>
-                <a:rPr lang="de-DE" sz="1200" b="1" dirty="0" err="1">
-                  <a:solidFill>
-                    <a:srgbClr val="00B0F0"/>
-                  </a:solidFill>
-                  <a:latin typeface="Courier New" panose="02070309020205020404" pitchFamily="49" charset="0"/>
-                  <a:ea typeface="Calibri" panose="020F0502020204030204" pitchFamily="34" charset="0"/>
-                  <a:cs typeface="Courier New" panose="02070309020205020404" pitchFamily="49" charset="0"/>
-                </a:rPr>
-                <a:t>age</a:t>
-              </a:r>
-              <a:r>
-                <a:rPr lang="de-DE" sz="1200" dirty="0">
-                  <a:latin typeface="Courier New" panose="02070309020205020404" pitchFamily="49" charset="0"/>
-                  <a:ea typeface="Calibri" panose="020F0502020204030204" pitchFamily="34" charset="0"/>
-                  <a:cs typeface="Courier New" panose="02070309020205020404" pitchFamily="49" charset="0"/>
-                </a:rPr>
-                <a:t> </a:t>
-              </a:r>
-              <a:r>
-                <a:rPr lang="de-DE" sz="1200" dirty="0" err="1">
-                  <a:latin typeface="Courier New" panose="02070309020205020404" pitchFamily="49" charset="0"/>
-                  <a:ea typeface="Calibri" panose="020F0502020204030204" pitchFamily="34" charset="0"/>
-                  <a:cs typeface="Courier New" panose="02070309020205020404" pitchFamily="49" charset="0"/>
-                </a:rPr>
-                <a:t>is</a:t>
-              </a:r>
-              <a:r>
-                <a:rPr lang="de-DE" sz="1200" dirty="0">
-                  <a:latin typeface="Courier New" panose="02070309020205020404" pitchFamily="49" charset="0"/>
-                  <a:ea typeface="Calibri" panose="020F0502020204030204" pitchFamily="34" charset="0"/>
-                  <a:cs typeface="Courier New" panose="02070309020205020404" pitchFamily="49" charset="0"/>
-                </a:rPr>
-                <a:t> </a:t>
-              </a:r>
-              <a:r>
-                <a:rPr lang="de-DE" sz="1200" b="1" dirty="0">
-                  <a:latin typeface="Courier New" panose="02070309020205020404" pitchFamily="49" charset="0"/>
-                  <a:ea typeface="Calibri" panose="020F0502020204030204" pitchFamily="34" charset="0"/>
-                  <a:cs typeface="Courier New" panose="02070309020205020404" pitchFamily="49" charset="0"/>
-                </a:rPr>
-                <a:t>LESS</a:t>
-              </a:r>
-              <a:r>
-                <a:rPr lang="de-DE" sz="1200" dirty="0">
-                  <a:latin typeface="Courier New" panose="02070309020205020404" pitchFamily="49" charset="0"/>
-                  <a:ea typeface="Calibri" panose="020F0502020204030204" pitchFamily="34" charset="0"/>
-                  <a:cs typeface="Courier New" panose="02070309020205020404" pitchFamily="49" charset="0"/>
-                </a:rPr>
-                <a:t> </a:t>
-              </a:r>
-              <a:r>
-                <a:rPr lang="de-DE" sz="1200" dirty="0" err="1">
-                  <a:latin typeface="Courier New" panose="02070309020205020404" pitchFamily="49" charset="0"/>
-                  <a:ea typeface="Calibri" panose="020F0502020204030204" pitchFamily="34" charset="0"/>
-                  <a:cs typeface="Courier New" panose="02070309020205020404" pitchFamily="49" charset="0"/>
-                </a:rPr>
-                <a:t>than</a:t>
-              </a:r>
-              <a:r>
-                <a:rPr lang="de-DE" sz="1200" dirty="0">
-                  <a:latin typeface="Courier New" panose="02070309020205020404" pitchFamily="49" charset="0"/>
-                  <a:ea typeface="Calibri" panose="020F0502020204030204" pitchFamily="34" charset="0"/>
-                  <a:cs typeface="Courier New" panose="02070309020205020404" pitchFamily="49" charset="0"/>
-                </a:rPr>
-                <a:t> </a:t>
-              </a:r>
-              <a:r>
-                <a:rPr lang="de-DE" sz="1200" b="1" dirty="0">
-                  <a:solidFill>
-                    <a:srgbClr val="00B0F0"/>
-                  </a:solidFill>
-                  <a:latin typeface="Courier New" panose="02070309020205020404" pitchFamily="49" charset="0"/>
-                  <a:ea typeface="Calibri" panose="020F0502020204030204" pitchFamily="34" charset="0"/>
-                  <a:cs typeface="Courier New" panose="02070309020205020404" pitchFamily="49" charset="0"/>
-                </a:rPr>
-                <a:t>18</a:t>
-              </a:r>
-              <a:r>
-                <a:rPr lang="de-DE" sz="1200" dirty="0">
-                  <a:latin typeface="Courier New" panose="02070309020205020404" pitchFamily="49" charset="0"/>
-                  <a:ea typeface="Calibri" panose="020F0502020204030204" pitchFamily="34" charset="0"/>
-                  <a:cs typeface="Courier New" panose="02070309020205020404" pitchFamily="49" charset="0"/>
-                </a:rPr>
-                <a:t> </a:t>
-              </a:r>
-              <a:r>
-                <a:rPr lang="de-DE" sz="1200" dirty="0" err="1">
-                  <a:latin typeface="Courier New" panose="02070309020205020404" pitchFamily="49" charset="0"/>
-                  <a:ea typeface="Calibri" panose="020F0502020204030204" pitchFamily="34" charset="0"/>
-                  <a:cs typeface="Courier New" panose="02070309020205020404" pitchFamily="49" charset="0"/>
-                </a:rPr>
-                <a:t>years</a:t>
-              </a:r>
-              <a:r>
-                <a:rPr lang="de-DE" sz="1200" dirty="0">
-                  <a:latin typeface="Consolas" panose="020B0609020204030204" pitchFamily="49" charset="0"/>
-                  <a:ea typeface="Calibri" panose="020F0502020204030204" pitchFamily="34" charset="0"/>
-                  <a:cs typeface="Times New Roman" panose="02020603050405020304" pitchFamily="18" charset="0"/>
-                </a:rPr>
-                <a:t/>
-              </a:r>
-              <a:br>
-                <a:rPr lang="de-DE" sz="1200" dirty="0">
-                  <a:latin typeface="Consolas" panose="020B0609020204030204" pitchFamily="49" charset="0"/>
-                  <a:ea typeface="Calibri" panose="020F0502020204030204" pitchFamily="34" charset="0"/>
-                  <a:cs typeface="Times New Roman" panose="02020603050405020304" pitchFamily="18" charset="0"/>
-                </a:rPr>
-              </a:br>
-              <a:r>
-                <a:rPr lang="de-DE" sz="1200" b="1" dirty="0">
-                  <a:latin typeface="Courier New" panose="02070309020205020404" pitchFamily="49" charset="0"/>
-                  <a:ea typeface="Calibri" panose="020F0502020204030204" pitchFamily="34" charset="0"/>
-                  <a:cs typeface="Courier New" panose="02070309020205020404" pitchFamily="49" charset="0"/>
-                </a:rPr>
-                <a:t>THEN   </a:t>
-              </a:r>
-              <a:r>
-                <a:rPr lang="de-DE" sz="1200" dirty="0" err="1">
-                  <a:latin typeface="Courier New" panose="02070309020205020404" pitchFamily="49" charset="0"/>
-                  <a:ea typeface="Calibri" panose="020F0502020204030204" pitchFamily="34" charset="0"/>
-                  <a:cs typeface="Courier New" panose="02070309020205020404" pitchFamily="49" charset="0"/>
-                </a:rPr>
-                <a:t>You</a:t>
-              </a:r>
-              <a:r>
-                <a:rPr lang="de-DE" sz="1200" dirty="0">
-                  <a:latin typeface="Courier New" panose="02070309020205020404" pitchFamily="49" charset="0"/>
-                  <a:ea typeface="Calibri" panose="020F0502020204030204" pitchFamily="34" charset="0"/>
-                  <a:cs typeface="Courier New" panose="02070309020205020404" pitchFamily="49" charset="0"/>
-                </a:rPr>
-                <a:t> </a:t>
-              </a:r>
-              <a:r>
-                <a:rPr lang="de-DE" sz="1200" dirty="0" err="1">
-                  <a:latin typeface="Courier New" panose="02070309020205020404" pitchFamily="49" charset="0"/>
-                  <a:ea typeface="Calibri" panose="020F0502020204030204" pitchFamily="34" charset="0"/>
-                  <a:cs typeface="Courier New" panose="02070309020205020404" pitchFamily="49" charset="0"/>
-                </a:rPr>
-                <a:t>are</a:t>
-              </a:r>
-              <a:r>
-                <a:rPr lang="de-DE" sz="1200" dirty="0">
-                  <a:latin typeface="Courier New" panose="02070309020205020404" pitchFamily="49" charset="0"/>
-                  <a:ea typeface="Calibri" panose="020F0502020204030204" pitchFamily="34" charset="0"/>
-                  <a:cs typeface="Courier New" panose="02070309020205020404" pitchFamily="49" charset="0"/>
-                </a:rPr>
-                <a:t> </a:t>
-              </a:r>
-              <a:r>
-                <a:rPr lang="de-DE" sz="1200" dirty="0" err="1">
-                  <a:latin typeface="Courier New" panose="02070309020205020404" pitchFamily="49" charset="0"/>
-                  <a:ea typeface="Calibri" panose="020F0502020204030204" pitchFamily="34" charset="0"/>
-                  <a:cs typeface="Courier New" panose="02070309020205020404" pitchFamily="49" charset="0"/>
-                </a:rPr>
-                <a:t>underage</a:t>
-              </a:r>
-              <a:r>
-                <a:rPr lang="de-DE" sz="1200" dirty="0">
-                  <a:latin typeface="Courier New" panose="02070309020205020404" pitchFamily="49" charset="0"/>
-                  <a:ea typeface="Calibri" panose="020F0502020204030204" pitchFamily="34" charset="0"/>
-                  <a:cs typeface="Courier New" panose="02070309020205020404" pitchFamily="49" charset="0"/>
-                </a:rPr>
-                <a:t> and </a:t>
-              </a:r>
-              <a:r>
-                <a:rPr lang="de-DE" sz="1200" dirty="0" err="1">
-                  <a:latin typeface="Courier New" panose="02070309020205020404" pitchFamily="49" charset="0"/>
-                  <a:ea typeface="Calibri" panose="020F0502020204030204" pitchFamily="34" charset="0"/>
-                  <a:cs typeface="Courier New" panose="02070309020205020404" pitchFamily="49" charset="0"/>
-                </a:rPr>
-                <a:t>can‘t</a:t>
-              </a:r>
-              <a:r>
-                <a:rPr lang="de-DE" sz="1200" dirty="0">
-                  <a:latin typeface="Courier New" panose="02070309020205020404" pitchFamily="49" charset="0"/>
-                  <a:ea typeface="Calibri" panose="020F0502020204030204" pitchFamily="34" charset="0"/>
-                  <a:cs typeface="Courier New" panose="02070309020205020404" pitchFamily="49" charset="0"/>
-                </a:rPr>
-                <a:t> </a:t>
-              </a:r>
-              <a:r>
-                <a:rPr lang="de-DE" sz="1200" dirty="0" err="1">
-                  <a:latin typeface="Courier New" panose="02070309020205020404" pitchFamily="49" charset="0"/>
-                  <a:ea typeface="Calibri" panose="020F0502020204030204" pitchFamily="34" charset="0"/>
-                  <a:cs typeface="Courier New" panose="02070309020205020404" pitchFamily="49" charset="0"/>
-                </a:rPr>
-                <a:t>sign</a:t>
-              </a:r>
-              <a:r>
-                <a:rPr lang="de-DE" sz="1200" dirty="0">
-                  <a:latin typeface="Courier New" panose="02070309020205020404" pitchFamily="49" charset="0"/>
-                  <a:ea typeface="Calibri" panose="020F0502020204030204" pitchFamily="34" charset="0"/>
-                  <a:cs typeface="Courier New" panose="02070309020205020404" pitchFamily="49" charset="0"/>
-                </a:rPr>
-                <a:t> </a:t>
-              </a:r>
-              <a:r>
-                <a:rPr lang="de-DE" sz="1200" dirty="0" err="1">
-                  <a:latin typeface="Courier New" panose="02070309020205020404" pitchFamily="49" charset="0"/>
-                  <a:ea typeface="Calibri" panose="020F0502020204030204" pitchFamily="34" charset="0"/>
-                  <a:cs typeface="Courier New" panose="02070309020205020404" pitchFamily="49" charset="0"/>
-                </a:rPr>
-                <a:t>this</a:t>
-              </a:r>
-              <a:r>
-                <a:rPr lang="de-DE" sz="1200" dirty="0">
-                  <a:latin typeface="Courier New" panose="02070309020205020404" pitchFamily="49" charset="0"/>
-                  <a:ea typeface="Calibri" panose="020F0502020204030204" pitchFamily="34" charset="0"/>
-                  <a:cs typeface="Courier New" panose="02070309020205020404" pitchFamily="49" charset="0"/>
-                </a:rPr>
-                <a:t> </a:t>
-              </a:r>
-              <a:r>
-                <a:rPr lang="de-DE" sz="1200" dirty="0" err="1">
-                  <a:latin typeface="Courier New" panose="02070309020205020404" pitchFamily="49" charset="0"/>
-                  <a:ea typeface="Calibri" panose="020F0502020204030204" pitchFamily="34" charset="0"/>
-                  <a:cs typeface="Courier New" panose="02070309020205020404" pitchFamily="49" charset="0"/>
-                </a:rPr>
-                <a:t>contract</a:t>
-              </a:r>
-              <a:r>
-                <a:rPr lang="de-DE" sz="1200" dirty="0">
-                  <a:latin typeface="Courier New" panose="02070309020205020404" pitchFamily="49" charset="0"/>
-                  <a:ea typeface="Calibri" panose="020F0502020204030204" pitchFamily="34" charset="0"/>
-                  <a:cs typeface="Courier New" panose="02070309020205020404" pitchFamily="49" charset="0"/>
-                </a:rPr>
-                <a:t>!</a:t>
-              </a:r>
-              <a:endParaRPr lang="de-DE" sz="1200" i="1" dirty="0">
-                <a:solidFill>
-                  <a:srgbClr val="C00000"/>
-                </a:solidFill>
-                <a:latin typeface="Courier New" panose="02070309020205020404" pitchFamily="49" charset="0"/>
-                <a:cs typeface="Courier New" panose="02070309020205020404" pitchFamily="49" charset="0"/>
-              </a:endParaRPr>
-            </a:p>
-          </p:txBody>
-        </p:sp>
-      </p:grpSp>
-      <p:cxnSp>
-        <p:nvCxnSpPr>
-          <p:cNvPr id="17" name="Gerade Verbindung mit Pfeil 4">
-            <a:extLst>
-              <a:ext uri="{FF2B5EF4-FFF2-40B4-BE49-F238E27FC236}">
-                <a16:creationId xmlns:a16="http://schemas.microsoft.com/office/drawing/2014/main" id="{20D537E6-B37F-495A-B8D5-C66433AB44BC}"/>
-              </a:ext>
-            </a:extLst>
-          </p:cNvPr>
-          <p:cNvCxnSpPr/>
-          <p:nvPr/>
-        </p:nvCxnSpPr>
-        <p:spPr>
-          <a:xfrm flipV="1">
-            <a:off x="5771623" y="2603911"/>
-            <a:ext cx="9000" cy="405427"/>
-          </a:xfrm>
-          <a:prstGeom prst="straightConnector1">
-            <a:avLst/>
-          </a:prstGeom>
-          <a:ln w="3175">
-            <a:solidFill>
-              <a:schemeClr val="bg1">
-                <a:lumMod val="95000"/>
-                <a:alpha val="66000"/>
-              </a:schemeClr>
-            </a:solidFill>
-            <a:prstDash val="dash"/>
-            <a:headEnd type="none" w="med" len="med"/>
-            <a:tailEnd type="none" w="sm" len="sm"/>
-          </a:ln>
-          <a:effectLst/>
-        </p:spPr>
-        <p:style>
-          <a:lnRef idx="2">
-            <a:schemeClr val="accent1"/>
-          </a:lnRef>
-          <a:fillRef idx="0">
-            <a:schemeClr val="accent1"/>
-          </a:fillRef>
-          <a:effectRef idx="1">
-            <a:schemeClr val="accent1"/>
-          </a:effectRef>
-          <a:fontRef idx="minor">
-            <a:schemeClr val="tx1"/>
-          </a:fontRef>
-        </p:style>
-      </p:cxnSp>
-      <p:pic>
-        <p:nvPicPr>
-          <p:cNvPr id="18" name="Grafik 17">
-            <a:extLst>
-              <a:ext uri="{FF2B5EF4-FFF2-40B4-BE49-F238E27FC236}">
-                <a16:creationId xmlns:a16="http://schemas.microsoft.com/office/drawing/2014/main" id="{A26680A1-2356-4E6C-9D72-D8595E64B544}"/>
-              </a:ext>
-            </a:extLst>
-          </p:cNvPr>
-          <p:cNvPicPr>
-            <a:picLocks noChangeAspect="1"/>
-          </p:cNvPicPr>
-          <p:nvPr/>
-        </p:nvPicPr>
-        <p:blipFill>
-          <a:blip r:embed="rId2">
-            <a:duotone>
-              <a:schemeClr val="accent3">
-                <a:shade val="45000"/>
-                <a:satMod val="135000"/>
-              </a:schemeClr>
-              <a:prstClr val="white"/>
-            </a:duotone>
-            <a:extLst>
-              <a:ext uri="{28A0092B-C50C-407E-A947-70E740481C1C}">
-                <a14:useLocalDpi xmlns:a14="http://schemas.microsoft.com/office/drawing/2010/main" val="0"/>
-              </a:ext>
-            </a:extLst>
-          </a:blip>
-          <a:stretch>
-            <a:fillRect/>
-          </a:stretch>
-        </p:blipFill>
-        <p:spPr>
-          <a:xfrm>
-            <a:off x="4980786" y="3116150"/>
-            <a:ext cx="1599675" cy="454997"/>
-          </a:xfrm>
-          <a:prstGeom prst="rect">
-            <a:avLst/>
-          </a:prstGeom>
-          <a:effectLst/>
-        </p:spPr>
-      </p:pic>
-      <p:cxnSp>
-        <p:nvCxnSpPr>
-          <p:cNvPr id="19" name="Gerade Verbindung mit Pfeil 4">
-            <a:extLst>
-              <a:ext uri="{FF2B5EF4-FFF2-40B4-BE49-F238E27FC236}">
-                <a16:creationId xmlns:a16="http://schemas.microsoft.com/office/drawing/2014/main" id="{C5697B01-CE6B-41B3-8F91-A3E57E43B3FD}"/>
-              </a:ext>
-            </a:extLst>
-          </p:cNvPr>
-          <p:cNvCxnSpPr/>
-          <p:nvPr/>
-        </p:nvCxnSpPr>
-        <p:spPr>
-          <a:xfrm flipV="1">
-            <a:off x="5762623" y="3756601"/>
-            <a:ext cx="9000" cy="405427"/>
-          </a:xfrm>
-          <a:prstGeom prst="straightConnector1">
-            <a:avLst/>
-          </a:prstGeom>
-          <a:ln w="3175">
-            <a:solidFill>
-              <a:schemeClr val="bg1">
-                <a:lumMod val="95000"/>
-                <a:alpha val="66000"/>
-              </a:schemeClr>
-            </a:solidFill>
-            <a:prstDash val="dash"/>
-            <a:headEnd type="stealth" w="med" len="med"/>
-            <a:tailEnd type="none" w="sm" len="sm"/>
-          </a:ln>
-          <a:effectLst/>
-        </p:spPr>
-        <p:style>
-          <a:lnRef idx="2">
-            <a:schemeClr val="accent1"/>
-          </a:lnRef>
-          <a:fillRef idx="0">
-            <a:schemeClr val="accent1"/>
-          </a:fillRef>
-          <a:effectRef idx="1">
-            <a:schemeClr val="accent1"/>
-          </a:effectRef>
-          <a:fontRef idx="minor">
-            <a:schemeClr val="tx1"/>
-          </a:fontRef>
-        </p:style>
-      </p:cxnSp>
-      <p:grpSp>
-        <p:nvGrpSpPr>
-          <p:cNvPr id="21" name="Gruppieren 20">
-            <a:extLst>
-              <a:ext uri="{FF2B5EF4-FFF2-40B4-BE49-F238E27FC236}">
-                <a16:creationId xmlns:a16="http://schemas.microsoft.com/office/drawing/2014/main" id="{30D461F6-FDBF-4174-95BD-BFCFFA28D77E}"/>
-              </a:ext>
-            </a:extLst>
-          </p:cNvPr>
-          <p:cNvGrpSpPr/>
-          <p:nvPr/>
-        </p:nvGrpSpPr>
-        <p:grpSpPr>
-          <a:xfrm>
-            <a:off x="2533102" y="4318907"/>
-            <a:ext cx="6495042" cy="1733550"/>
-            <a:chOff x="2640741" y="4549699"/>
-            <a:chExt cx="6495042" cy="1733550"/>
-          </a:xfrm>
-        </p:grpSpPr>
-        <p:sp>
-          <p:nvSpPr>
-            <p:cNvPr id="22" name="Abgerundetes Rechteck 19">
-              <a:extLst>
-                <a:ext uri="{FF2B5EF4-FFF2-40B4-BE49-F238E27FC236}">
-                  <a16:creationId xmlns:a16="http://schemas.microsoft.com/office/drawing/2014/main" id="{7E311FE5-D939-4B6D-A1BA-046D4B522F40}"/>
-                </a:ext>
-              </a:extLst>
-            </p:cNvPr>
-            <p:cNvSpPr/>
-            <p:nvPr/>
-          </p:nvSpPr>
-          <p:spPr>
-            <a:xfrm>
-              <a:off x="2640741" y="4549699"/>
-              <a:ext cx="6495042" cy="1733550"/>
-            </a:xfrm>
-            <a:prstGeom prst="roundRect">
-              <a:avLst>
-                <a:gd name="adj" fmla="val 6227"/>
-              </a:avLst>
-            </a:prstGeom>
-            <a:solidFill>
-              <a:srgbClr val="ECF3FA"/>
-            </a:solidFill>
-            <a:ln>
-              <a:noFill/>
-            </a:ln>
-            <a:effectLst>
-              <a:outerShdw blurRad="139700" dist="215900" dir="2700000" algn="tl" rotWithShape="0">
-                <a:prstClr val="black">
-                  <a:alpha val="5000"/>
-                </a:prstClr>
-              </a:outerShdw>
-            </a:effectLst>
-          </p:spPr>
-          <p:style>
-            <a:lnRef idx="2">
-              <a:schemeClr val="accent1">
-                <a:shade val="50000"/>
-              </a:schemeClr>
-            </a:lnRef>
-            <a:fillRef idx="1">
-              <a:schemeClr val="accent1"/>
-            </a:fillRef>
-            <a:effectRef idx="0">
-              <a:schemeClr val="accent1"/>
-            </a:effectRef>
-            <a:fontRef idx="minor">
-              <a:schemeClr val="lt1"/>
-            </a:fontRef>
-          </p:style>
-          <p:txBody>
-            <a:bodyPr rtlCol="0" anchor="b" anchorCtr="0"/>
-            <a:lstStyle/>
-            <a:p>
-              <a:pPr algn="ctr"/>
-              <a:endParaRPr lang="de-DE" sz="1400" dirty="0">
-                <a:solidFill>
-                  <a:schemeClr val="tx1">
-                    <a:lumMod val="65000"/>
-                    <a:lumOff val="35000"/>
-                  </a:schemeClr>
-                </a:solidFill>
-                <a:latin typeface="+mj-lt"/>
-              </a:endParaRPr>
-            </a:p>
-          </p:txBody>
-        </p:sp>
-        <p:sp>
-          <p:nvSpPr>
-            <p:cNvPr id="24" name="Rechteck 23">
-              <a:extLst>
-                <a:ext uri="{FF2B5EF4-FFF2-40B4-BE49-F238E27FC236}">
-                  <a16:creationId xmlns:a16="http://schemas.microsoft.com/office/drawing/2014/main" id="{9664CB5E-F4F0-4FF2-8A41-3C2CC69D3188}"/>
-                </a:ext>
-              </a:extLst>
-            </p:cNvPr>
-            <p:cNvSpPr/>
-            <p:nvPr/>
-          </p:nvSpPr>
-          <p:spPr>
-            <a:xfrm>
-              <a:off x="3031358" y="4959959"/>
-              <a:ext cx="5713808" cy="1015663"/>
-            </a:xfrm>
-            <a:prstGeom prst="rect">
-              <a:avLst/>
-            </a:prstGeom>
-            <a:ln>
-              <a:noFill/>
-            </a:ln>
-          </p:spPr>
-          <p:txBody>
-            <a:bodyPr wrap="square">
-              <a:spAutoFit/>
-            </a:bodyPr>
-            <a:lstStyle/>
-            <a:p>
-              <a:r>
-                <a:rPr lang="de-DE" sz="1200" b="1" dirty="0">
-                  <a:solidFill>
-                    <a:srgbClr val="004362"/>
-                  </a:solidFill>
-                  <a:latin typeface="Courier New" panose="02070309020205020404" pitchFamily="49" charset="0"/>
-                  <a:ea typeface="Calibri" panose="020F0502020204030204" pitchFamily="34" charset="0"/>
-                  <a:cs typeface="Courier New" panose="02070309020205020404" pitchFamily="49" charset="0"/>
-                </a:rPr>
-                <a:t>if</a:t>
-              </a:r>
-              <a:r>
-                <a:rPr lang="de-DE" sz="1200" b="1" dirty="0">
-                  <a:latin typeface="Courier New" panose="02070309020205020404" pitchFamily="49" charset="0"/>
-                  <a:ea typeface="Calibri" panose="020F0502020204030204" pitchFamily="34" charset="0"/>
-                  <a:cs typeface="Courier New" panose="02070309020205020404" pitchFamily="49" charset="0"/>
-                </a:rPr>
-                <a:t> ( </a:t>
-              </a:r>
-              <a:r>
-                <a:rPr lang="de-DE" sz="1200" b="1" dirty="0" err="1">
-                  <a:solidFill>
-                    <a:srgbClr val="00C1E4"/>
-                  </a:solidFill>
-                  <a:latin typeface="Courier New" panose="02070309020205020404" pitchFamily="49" charset="0"/>
-                  <a:ea typeface="Calibri" panose="020F0502020204030204" pitchFamily="34" charset="0"/>
-                  <a:cs typeface="Courier New" panose="02070309020205020404" pitchFamily="49" charset="0"/>
-                </a:rPr>
-                <a:t>Person</a:t>
-              </a:r>
-              <a:r>
-                <a:rPr lang="de-DE" sz="1200" b="1" dirty="0" err="1">
-                  <a:latin typeface="Courier New" panose="02070309020205020404" pitchFamily="49" charset="0"/>
-                  <a:ea typeface="Calibri" panose="020F0502020204030204" pitchFamily="34" charset="0"/>
-                  <a:cs typeface="Courier New" panose="02070309020205020404" pitchFamily="49" charset="0"/>
-                </a:rPr>
-                <a:t>.</a:t>
-              </a:r>
-              <a:r>
-                <a:rPr lang="de-DE" sz="1200" b="1" dirty="0" err="1">
-                  <a:solidFill>
-                    <a:srgbClr val="00C1E4"/>
-                  </a:solidFill>
-                  <a:latin typeface="Courier New" panose="02070309020205020404" pitchFamily="49" charset="0"/>
-                  <a:ea typeface="Calibri" panose="020F0502020204030204" pitchFamily="34" charset="0"/>
-                  <a:cs typeface="Courier New" panose="02070309020205020404" pitchFamily="49" charset="0"/>
-                </a:rPr>
-                <a:t>age</a:t>
-              </a:r>
-              <a:r>
-                <a:rPr lang="de-DE" sz="1200" b="1" dirty="0">
-                  <a:latin typeface="Courier New" panose="02070309020205020404" pitchFamily="49" charset="0"/>
-                  <a:ea typeface="Calibri" panose="020F0502020204030204" pitchFamily="34" charset="0"/>
-                  <a:cs typeface="Courier New" panose="02070309020205020404" pitchFamily="49" charset="0"/>
-                </a:rPr>
-                <a:t> &lt; </a:t>
-              </a:r>
-              <a:r>
-                <a:rPr lang="de-DE" sz="1200" b="1" dirty="0">
-                  <a:solidFill>
-                    <a:srgbClr val="00C1E4"/>
-                  </a:solidFill>
-                  <a:latin typeface="Courier New" panose="02070309020205020404" pitchFamily="49" charset="0"/>
-                  <a:ea typeface="Calibri" panose="020F0502020204030204" pitchFamily="34" charset="0"/>
-                  <a:cs typeface="Courier New" panose="02070309020205020404" pitchFamily="49" charset="0"/>
-                </a:rPr>
-                <a:t>18</a:t>
-              </a:r>
-              <a:r>
-                <a:rPr lang="de-DE" sz="1200" b="1" dirty="0">
-                  <a:latin typeface="Courier New" panose="02070309020205020404" pitchFamily="49" charset="0"/>
-                  <a:ea typeface="Calibri" panose="020F0502020204030204" pitchFamily="34" charset="0"/>
-                  <a:cs typeface="Courier New" panose="02070309020205020404" pitchFamily="49" charset="0"/>
-                </a:rPr>
-                <a:t> ){</a:t>
-              </a:r>
-            </a:p>
-            <a:p>
-              <a:r>
-                <a:rPr lang="de-DE" sz="1200" b="1" dirty="0">
-                  <a:latin typeface="Courier New" panose="02070309020205020404" pitchFamily="49" charset="0"/>
-                  <a:ea typeface="Calibri" panose="020F0502020204030204" pitchFamily="34" charset="0"/>
-                  <a:cs typeface="Courier New" panose="02070309020205020404" pitchFamily="49" charset="0"/>
-                </a:rPr>
-                <a:t>    </a:t>
-              </a:r>
-              <a:r>
-                <a:rPr lang="de-DE" sz="1200" b="1" dirty="0">
-                  <a:solidFill>
-                    <a:srgbClr val="004362"/>
-                  </a:solidFill>
-                  <a:latin typeface="Courier New" panose="02070309020205020404" pitchFamily="49" charset="0"/>
-                  <a:ea typeface="Calibri" panose="020F0502020204030204" pitchFamily="34" charset="0"/>
-                  <a:cs typeface="Courier New" panose="02070309020205020404" pitchFamily="49" charset="0"/>
-                </a:rPr>
-                <a:t>throw</a:t>
-              </a:r>
-              <a:r>
-                <a:rPr lang="de-DE" sz="1200" b="1" dirty="0">
-                  <a:latin typeface="Courier New" panose="02070309020205020404" pitchFamily="49" charset="0"/>
-                  <a:ea typeface="Calibri" panose="020F0502020204030204" pitchFamily="34" charset="0"/>
-                  <a:cs typeface="Courier New" panose="02070309020205020404" pitchFamily="49" charset="0"/>
-                </a:rPr>
-                <a:t> </a:t>
-              </a:r>
-              <a:r>
-                <a:rPr lang="de-DE" sz="1200" b="1" dirty="0">
-                  <a:solidFill>
-                    <a:srgbClr val="004362"/>
-                  </a:solidFill>
-                  <a:latin typeface="Courier New" panose="02070309020205020404" pitchFamily="49" charset="0"/>
-                  <a:ea typeface="Calibri" panose="020F0502020204030204" pitchFamily="34" charset="0"/>
-                  <a:cs typeface="Courier New" panose="02070309020205020404" pitchFamily="49" charset="0"/>
-                </a:rPr>
-                <a:t>new</a:t>
-              </a:r>
-              <a:r>
-                <a:rPr lang="de-DE" sz="1200" b="1" dirty="0">
-                  <a:latin typeface="Courier New" panose="02070309020205020404" pitchFamily="49" charset="0"/>
-                  <a:ea typeface="Calibri" panose="020F0502020204030204" pitchFamily="34" charset="0"/>
-                  <a:cs typeface="Courier New" panose="02070309020205020404" pitchFamily="49" charset="0"/>
-                </a:rPr>
-                <a:t> </a:t>
-              </a:r>
-              <a:r>
-                <a:rPr lang="de-DE" sz="1200" b="1" dirty="0" err="1">
-                  <a:latin typeface="Courier New" panose="02070309020205020404" pitchFamily="49" charset="0"/>
-                  <a:ea typeface="Calibri" panose="020F0502020204030204" pitchFamily="34" charset="0"/>
-                  <a:cs typeface="Courier New" panose="02070309020205020404" pitchFamily="49" charset="0"/>
-                </a:rPr>
-                <a:t>Exception</a:t>
-              </a:r>
-              <a:r>
-                <a:rPr lang="de-DE" sz="1200" b="1" dirty="0">
-                  <a:latin typeface="Courier New" panose="02070309020205020404" pitchFamily="49" charset="0"/>
-                  <a:ea typeface="Calibri" panose="020F0502020204030204" pitchFamily="34" charset="0"/>
-                  <a:cs typeface="Courier New" panose="02070309020205020404" pitchFamily="49" charset="0"/>
-                </a:rPr>
-                <a:t>(</a:t>
-              </a:r>
-              <a:r>
-                <a:rPr lang="de-DE" sz="1200" b="1" dirty="0">
-                  <a:solidFill>
-                    <a:srgbClr val="C00000"/>
-                  </a:solidFill>
-                  <a:latin typeface="Courier New" panose="02070309020205020404" pitchFamily="49" charset="0"/>
-                  <a:ea typeface="Calibri" panose="020F0502020204030204" pitchFamily="34" charset="0"/>
-                  <a:cs typeface="Courier New" panose="02070309020205020404" pitchFamily="49" charset="0"/>
-                </a:rPr>
-                <a:t>„</a:t>
-              </a:r>
-              <a:r>
-                <a:rPr lang="de-DE" sz="1200" dirty="0">
-                  <a:solidFill>
-                    <a:srgbClr val="C00000"/>
-                  </a:solidFill>
-                  <a:latin typeface="Courier New" panose="02070309020205020404" pitchFamily="49" charset="0"/>
-                  <a:ea typeface="Calibri" panose="020F0502020204030204" pitchFamily="34" charset="0"/>
-                  <a:cs typeface="Courier New" panose="02070309020205020404" pitchFamily="49" charset="0"/>
-                </a:rPr>
-                <a:t> </a:t>
-              </a:r>
-              <a:r>
-                <a:rPr lang="de-DE" sz="1200" dirty="0" err="1">
-                  <a:solidFill>
-                    <a:srgbClr val="C00000"/>
-                  </a:solidFill>
-                  <a:latin typeface="Courier New" panose="02070309020205020404" pitchFamily="49" charset="0"/>
-                  <a:ea typeface="Calibri" panose="020F0502020204030204" pitchFamily="34" charset="0"/>
-                  <a:cs typeface="Courier New" panose="02070309020205020404" pitchFamily="49" charset="0"/>
-                </a:rPr>
-                <a:t>You</a:t>
-              </a:r>
-              <a:r>
-                <a:rPr lang="de-DE" sz="1200" dirty="0">
-                  <a:solidFill>
-                    <a:srgbClr val="C00000"/>
-                  </a:solidFill>
-                  <a:latin typeface="Courier New" panose="02070309020205020404" pitchFamily="49" charset="0"/>
-                  <a:ea typeface="Calibri" panose="020F0502020204030204" pitchFamily="34" charset="0"/>
-                  <a:cs typeface="Courier New" panose="02070309020205020404" pitchFamily="49" charset="0"/>
-                </a:rPr>
-                <a:t> </a:t>
-              </a:r>
-              <a:r>
-                <a:rPr lang="de-DE" sz="1200" dirty="0" err="1">
-                  <a:solidFill>
-                    <a:srgbClr val="C00000"/>
-                  </a:solidFill>
-                  <a:latin typeface="Courier New" panose="02070309020205020404" pitchFamily="49" charset="0"/>
-                  <a:ea typeface="Calibri" panose="020F0502020204030204" pitchFamily="34" charset="0"/>
-                  <a:cs typeface="Courier New" panose="02070309020205020404" pitchFamily="49" charset="0"/>
-                </a:rPr>
-                <a:t>are</a:t>
-              </a:r>
-              <a:r>
-                <a:rPr lang="de-DE" sz="1200" dirty="0">
-                  <a:solidFill>
-                    <a:srgbClr val="C00000"/>
-                  </a:solidFill>
-                  <a:latin typeface="Courier New" panose="02070309020205020404" pitchFamily="49" charset="0"/>
-                  <a:ea typeface="Calibri" panose="020F0502020204030204" pitchFamily="34" charset="0"/>
-                  <a:cs typeface="Courier New" panose="02070309020205020404" pitchFamily="49" charset="0"/>
-                </a:rPr>
-                <a:t> </a:t>
-              </a:r>
-              <a:r>
-                <a:rPr lang="de-DE" sz="1200" dirty="0" err="1">
-                  <a:solidFill>
-                    <a:srgbClr val="C00000"/>
-                  </a:solidFill>
-                  <a:latin typeface="Courier New" panose="02070309020205020404" pitchFamily="49" charset="0"/>
-                  <a:ea typeface="Calibri" panose="020F0502020204030204" pitchFamily="34" charset="0"/>
-                  <a:cs typeface="Courier New" panose="02070309020205020404" pitchFamily="49" charset="0"/>
-                </a:rPr>
-                <a:t>underage</a:t>
-              </a:r>
-              <a:r>
-                <a:rPr lang="de-DE" sz="1200" dirty="0">
-                  <a:solidFill>
-                    <a:srgbClr val="C00000"/>
-                  </a:solidFill>
-                  <a:latin typeface="Courier New" panose="02070309020205020404" pitchFamily="49" charset="0"/>
-                  <a:ea typeface="Calibri" panose="020F0502020204030204" pitchFamily="34" charset="0"/>
-                  <a:cs typeface="Courier New" panose="02070309020205020404" pitchFamily="49" charset="0"/>
-                </a:rPr>
-                <a:t> and </a:t>
-              </a:r>
-              <a:r>
-                <a:rPr lang="de-DE" sz="1200" dirty="0" err="1">
-                  <a:solidFill>
-                    <a:srgbClr val="C00000"/>
-                  </a:solidFill>
-                  <a:latin typeface="Courier New" panose="02070309020205020404" pitchFamily="49" charset="0"/>
-                  <a:ea typeface="Calibri" panose="020F0502020204030204" pitchFamily="34" charset="0"/>
-                  <a:cs typeface="Courier New" panose="02070309020205020404" pitchFamily="49" charset="0"/>
-                </a:rPr>
-                <a:t>can‘t</a:t>
-              </a:r>
-              <a:r>
-                <a:rPr lang="de-DE" sz="1200" dirty="0">
-                  <a:solidFill>
-                    <a:srgbClr val="C00000"/>
-                  </a:solidFill>
-                  <a:latin typeface="Courier New" panose="02070309020205020404" pitchFamily="49" charset="0"/>
-                  <a:ea typeface="Calibri" panose="020F0502020204030204" pitchFamily="34" charset="0"/>
-                  <a:cs typeface="Courier New" panose="02070309020205020404" pitchFamily="49" charset="0"/>
-                </a:rPr>
-                <a:t> </a:t>
-              </a:r>
-              <a:r>
-                <a:rPr lang="de-DE" sz="1200" dirty="0" err="1">
-                  <a:solidFill>
-                    <a:srgbClr val="C00000"/>
-                  </a:solidFill>
-                  <a:latin typeface="Courier New" panose="02070309020205020404" pitchFamily="49" charset="0"/>
-                  <a:ea typeface="Calibri" panose="020F0502020204030204" pitchFamily="34" charset="0"/>
-                  <a:cs typeface="Courier New" panose="02070309020205020404" pitchFamily="49" charset="0"/>
-                </a:rPr>
-                <a:t>sign</a:t>
-              </a:r>
-              <a:r>
-                <a:rPr lang="de-DE" sz="1200" dirty="0">
-                  <a:solidFill>
-                    <a:srgbClr val="C00000"/>
-                  </a:solidFill>
-                  <a:latin typeface="Courier New" panose="02070309020205020404" pitchFamily="49" charset="0"/>
-                  <a:ea typeface="Calibri" panose="020F0502020204030204" pitchFamily="34" charset="0"/>
-                  <a:cs typeface="Courier New" panose="02070309020205020404" pitchFamily="49" charset="0"/>
-                </a:rPr>
-                <a:t> 			      </a:t>
-              </a:r>
-              <a:r>
-                <a:rPr lang="de-DE" sz="1200" dirty="0" err="1">
-                  <a:solidFill>
-                    <a:srgbClr val="C00000"/>
-                  </a:solidFill>
-                  <a:latin typeface="Courier New" panose="02070309020205020404" pitchFamily="49" charset="0"/>
-                  <a:ea typeface="Calibri" panose="020F0502020204030204" pitchFamily="34" charset="0"/>
-                  <a:cs typeface="Courier New" panose="02070309020205020404" pitchFamily="49" charset="0"/>
-                </a:rPr>
-                <a:t>this</a:t>
-              </a:r>
-              <a:r>
-                <a:rPr lang="de-DE" sz="1200" dirty="0">
-                  <a:solidFill>
-                    <a:srgbClr val="C00000"/>
-                  </a:solidFill>
-                  <a:latin typeface="Courier New" panose="02070309020205020404" pitchFamily="49" charset="0"/>
-                  <a:ea typeface="Calibri" panose="020F0502020204030204" pitchFamily="34" charset="0"/>
-                  <a:cs typeface="Courier New" panose="02070309020205020404" pitchFamily="49" charset="0"/>
-                </a:rPr>
-                <a:t> </a:t>
-              </a:r>
-              <a:r>
-                <a:rPr lang="de-DE" sz="1200" dirty="0" err="1">
-                  <a:solidFill>
-                    <a:srgbClr val="C00000"/>
-                  </a:solidFill>
-                  <a:latin typeface="Courier New" panose="02070309020205020404" pitchFamily="49" charset="0"/>
-                  <a:ea typeface="Calibri" panose="020F0502020204030204" pitchFamily="34" charset="0"/>
-                  <a:cs typeface="Courier New" panose="02070309020205020404" pitchFamily="49" charset="0"/>
-                </a:rPr>
-                <a:t>contract</a:t>
-              </a:r>
-              <a:r>
-                <a:rPr lang="de-DE" sz="1200" i="1" dirty="0">
-                  <a:solidFill>
-                    <a:srgbClr val="C00000"/>
-                  </a:solidFill>
-                  <a:latin typeface="Courier New" panose="02070309020205020404" pitchFamily="49" charset="0"/>
-                  <a:ea typeface="Calibri" panose="020F0502020204030204" pitchFamily="34" charset="0"/>
-                  <a:cs typeface="Courier New" panose="02070309020205020404" pitchFamily="49" charset="0"/>
-                </a:rPr>
-                <a:t>!</a:t>
-              </a:r>
-              <a:r>
-                <a:rPr lang="de-DE" sz="1200" b="1" dirty="0">
-                  <a:solidFill>
-                    <a:srgbClr val="C00000"/>
-                  </a:solidFill>
-                  <a:latin typeface="Courier New" panose="02070309020205020404" pitchFamily="49" charset="0"/>
-                  <a:ea typeface="Calibri" panose="020F0502020204030204" pitchFamily="34" charset="0"/>
-                  <a:cs typeface="Courier New" panose="02070309020205020404" pitchFamily="49" charset="0"/>
-                </a:rPr>
-                <a:t>“</a:t>
-              </a:r>
-              <a:r>
-                <a:rPr lang="de-DE" sz="1200" b="1" dirty="0">
-                  <a:latin typeface="Courier New" panose="02070309020205020404" pitchFamily="49" charset="0"/>
-                  <a:ea typeface="Calibri" panose="020F0502020204030204" pitchFamily="34" charset="0"/>
-                  <a:cs typeface="Courier New" panose="02070309020205020404" pitchFamily="49" charset="0"/>
-                </a:rPr>
-                <a:t>);</a:t>
-              </a:r>
-            </a:p>
-            <a:p>
-              <a:r>
-                <a:rPr lang="de-DE" sz="1200" b="1" dirty="0">
-                  <a:latin typeface="Courier New" panose="02070309020205020404" pitchFamily="49" charset="0"/>
-                  <a:ea typeface="Calibri" panose="020F0502020204030204" pitchFamily="34" charset="0"/>
-                  <a:cs typeface="Courier New" panose="02070309020205020404" pitchFamily="49" charset="0"/>
-                </a:rPr>
-                <a:t>}</a:t>
-              </a:r>
-              <a:endParaRPr lang="de-DE" sz="1200" i="1" dirty="0">
-                <a:solidFill>
-                  <a:schemeClr val="tx1">
-                    <a:lumMod val="50000"/>
-                    <a:lumOff val="50000"/>
-                  </a:schemeClr>
-                </a:solidFill>
-                <a:latin typeface="Courier New" panose="02070309020205020404" pitchFamily="49" charset="0"/>
-                <a:ea typeface="Calibri" panose="020F0502020204030204" pitchFamily="34" charset="0"/>
-                <a:cs typeface="Courier New" panose="02070309020205020404" pitchFamily="49" charset="0"/>
-              </a:endParaRPr>
-            </a:p>
-            <a:p>
-              <a:r>
-                <a:rPr lang="de-DE" sz="1200" i="1" dirty="0">
-                  <a:solidFill>
-                    <a:schemeClr val="tx1">
-                      <a:lumMod val="50000"/>
-                      <a:lumOff val="50000"/>
-                    </a:schemeClr>
-                  </a:solidFill>
-                  <a:latin typeface="Courier New" panose="02070309020205020404" pitchFamily="49" charset="0"/>
-                  <a:ea typeface="Calibri" panose="020F0502020204030204" pitchFamily="34" charset="0"/>
-                  <a:cs typeface="Courier New" panose="02070309020205020404" pitchFamily="49" charset="0"/>
-                </a:rPr>
-                <a:t>       </a:t>
-              </a:r>
-              <a:endParaRPr lang="de-DE" sz="1200" i="1" dirty="0">
-                <a:solidFill>
-                  <a:schemeClr val="tx1">
-                    <a:lumMod val="50000"/>
-                    <a:lumOff val="50000"/>
-                  </a:schemeClr>
-                </a:solidFill>
-                <a:latin typeface="Courier New" panose="02070309020205020404" pitchFamily="49" charset="0"/>
-                <a:cs typeface="Courier New" panose="02070309020205020404" pitchFamily="49" charset="0"/>
-              </a:endParaRPr>
-            </a:p>
-          </p:txBody>
-        </p:sp>
-      </p:grpSp>
-    </p:spTree>
-    <p:extLst>
-      <p:ext uri="{BB962C8B-B14F-4D97-AF65-F5344CB8AC3E}">
-        <p14:creationId xmlns:p14="http://schemas.microsoft.com/office/powerpoint/2010/main" val="4286552020"/>
       </p:ext>
     </p:extLst>
   </p:cSld>

</xml_diff>